<commit_message>
Deployed 3c34975 with MkDocs version: 1.1.2
</commit_message>
<xml_diff>
--- a/presentations/ekg-book-figures.pptx
+++ b/presentations/ekg-book-figures.pptx
@@ -6,9 +6,10 @@
   </p:sldMasterIdLst>
   <p:sldIdLst>
     <p:sldId id="256" r:id="rId2"/>
-    <p:sldId id="257" r:id="rId3"/>
-    <p:sldId id="264" r:id="rId4"/>
-    <p:sldId id="265" r:id="rId5"/>
+    <p:sldId id="266" r:id="rId3"/>
+    <p:sldId id="257" r:id="rId4"/>
+    <p:sldId id="264" r:id="rId5"/>
+    <p:sldId id="265" r:id="rId6"/>
   </p:sldIdLst>
   <p:sldSz cx="12192000" cy="6858000"/>
   <p:notesSz cx="6858000" cy="9144000"/>
@@ -3414,6 +3415,342 @@
       </p:grpSpPr>
       <p:sp>
         <p:nvSpPr>
+          <p:cNvPr id="2" name="Title 1">
+            <a:extLst>
+              <a:ext uri="{FF2B5EF4-FFF2-40B4-BE49-F238E27FC236}">
+                <a16:creationId xmlns:a16="http://schemas.microsoft.com/office/drawing/2014/main" id="{8379E213-17EB-FE4C-877D-D1D12A24204F}"/>
+              </a:ext>
+            </a:extLst>
+          </p:cNvPr>
+          <p:cNvSpPr>
+            <a:spLocks noGrp="1"/>
+          </p:cNvSpPr>
+          <p:nvPr>
+            <p:ph type="title"/>
+          </p:nvPr>
+        </p:nvSpPr>
+        <p:spPr/>
+        <p:txBody>
+          <a:bodyPr/>
+          <a:lstStyle/>
+          <a:p>
+            <a:endParaRPr lang="en-US"/>
+          </a:p>
+        </p:txBody>
+      </p:sp>
+      <p:sp>
+        <p:nvSpPr>
+          <p:cNvPr id="3" name="Content Placeholder 2">
+            <a:extLst>
+              <a:ext uri="{FF2B5EF4-FFF2-40B4-BE49-F238E27FC236}">
+                <a16:creationId xmlns:a16="http://schemas.microsoft.com/office/drawing/2014/main" id="{EF1A1B54-4A4B-D74E-9AFB-91CF7B06097D}"/>
+              </a:ext>
+            </a:extLst>
+          </p:cNvPr>
+          <p:cNvSpPr>
+            <a:spLocks noGrp="1"/>
+          </p:cNvSpPr>
+          <p:nvPr>
+            <p:ph idx="1"/>
+          </p:nvPr>
+        </p:nvSpPr>
+        <p:spPr>
+          <a:xfrm>
+            <a:off x="838200" y="4851399"/>
+            <a:ext cx="10515600" cy="1325564"/>
+          </a:xfrm>
+        </p:spPr>
+        <p:txBody>
+          <a:bodyPr/>
+          <a:lstStyle/>
+          <a:p>
+            <a:endParaRPr lang="en-US" dirty="0"/>
+          </a:p>
+        </p:txBody>
+      </p:sp>
+      <p:pic>
+        <p:nvPicPr>
+          <p:cNvPr id="4" name="Picture 3">
+            <a:extLst>
+              <a:ext uri="{FF2B5EF4-FFF2-40B4-BE49-F238E27FC236}">
+                <a16:creationId xmlns:a16="http://schemas.microsoft.com/office/drawing/2014/main" id="{44974AA9-5D4B-4149-AEAB-88F31006857B}"/>
+              </a:ext>
+            </a:extLst>
+          </p:cNvPr>
+          <p:cNvPicPr>
+            <a:picLocks noChangeAspect="1"/>
+          </p:cNvPicPr>
+          <p:nvPr/>
+        </p:nvPicPr>
+        <p:blipFill>
+          <a:blip r:embed="rId2"/>
+          <a:stretch>
+            <a:fillRect/>
+          </a:stretch>
+        </p:blipFill>
+        <p:spPr>
+          <a:xfrm>
+            <a:off x="5143500" y="2233534"/>
+            <a:ext cx="1905000" cy="1371600"/>
+          </a:xfrm>
+          <a:prstGeom prst="rect">
+            <a:avLst/>
+          </a:prstGeom>
+        </p:spPr>
+      </p:pic>
+      <p:sp>
+        <p:nvSpPr>
+          <p:cNvPr id="5" name="TextBox 4">
+            <a:extLst>
+              <a:ext uri="{FF2B5EF4-FFF2-40B4-BE49-F238E27FC236}">
+                <a16:creationId xmlns:a16="http://schemas.microsoft.com/office/drawing/2014/main" id="{15CC9381-FD7F-DB4F-980D-18BA1BDBD699}"/>
+              </a:ext>
+            </a:extLst>
+          </p:cNvPr>
+          <p:cNvSpPr txBox="1"/>
+          <p:nvPr/>
+        </p:nvSpPr>
+        <p:spPr>
+          <a:xfrm>
+            <a:off x="3899303" y="2233535"/>
+            <a:ext cx="1098699" cy="1200329"/>
+          </a:xfrm>
+          <a:prstGeom prst="rect">
+            <a:avLst/>
+          </a:prstGeom>
+          <a:noFill/>
+        </p:spPr>
+        <p:txBody>
+          <a:bodyPr wrap="none" rtlCol="0">
+            <a:spAutoFit/>
+          </a:bodyPr>
+          <a:lstStyle/>
+          <a:p>
+            <a:pPr algn="ctr"/>
+            <a:r>
+              <a:rPr lang="en-US" sz="3600" dirty="0">
+                <a:solidFill>
+                  <a:srgbClr val="FF0000"/>
+                </a:solidFill>
+              </a:rPr>
+              <a:t>Too</a:t>
+            </a:r>
+          </a:p>
+          <a:p>
+            <a:pPr algn="ctr"/>
+            <a:r>
+              <a:rPr lang="en-US" sz="3600" dirty="0">
+                <a:solidFill>
+                  <a:srgbClr val="FF0000"/>
+                </a:solidFill>
+              </a:rPr>
+              <a:t>Early</a:t>
+            </a:r>
+          </a:p>
+        </p:txBody>
+      </p:sp>
+      <p:sp>
+        <p:nvSpPr>
+          <p:cNvPr id="6" name="TextBox 5">
+            <a:extLst>
+              <a:ext uri="{FF2B5EF4-FFF2-40B4-BE49-F238E27FC236}">
+                <a16:creationId xmlns:a16="http://schemas.microsoft.com/office/drawing/2014/main" id="{215F193A-F5C6-874B-9F17-F55F06A9B2B4}"/>
+              </a:ext>
+            </a:extLst>
+          </p:cNvPr>
+          <p:cNvSpPr txBox="1"/>
+          <p:nvPr/>
+        </p:nvSpPr>
+        <p:spPr>
+          <a:xfrm>
+            <a:off x="7121499" y="2233534"/>
+            <a:ext cx="973729" cy="1200329"/>
+          </a:xfrm>
+          <a:prstGeom prst="rect">
+            <a:avLst/>
+          </a:prstGeom>
+          <a:noFill/>
+        </p:spPr>
+        <p:txBody>
+          <a:bodyPr wrap="none" rtlCol="0">
+            <a:spAutoFit/>
+          </a:bodyPr>
+          <a:lstStyle/>
+          <a:p>
+            <a:pPr algn="ctr"/>
+            <a:r>
+              <a:rPr lang="en-US" sz="3600" dirty="0">
+                <a:solidFill>
+                  <a:srgbClr val="FF0000"/>
+                </a:solidFill>
+              </a:rPr>
+              <a:t>Too</a:t>
+            </a:r>
+          </a:p>
+          <a:p>
+            <a:pPr algn="ctr"/>
+            <a:r>
+              <a:rPr lang="en-US" sz="3600" dirty="0">
+                <a:solidFill>
+                  <a:srgbClr val="FF0000"/>
+                </a:solidFill>
+              </a:rPr>
+              <a:t>Late</a:t>
+            </a:r>
+          </a:p>
+        </p:txBody>
+      </p:sp>
+      <p:cxnSp>
+        <p:nvCxnSpPr>
+          <p:cNvPr id="8" name="Straight Arrow Connector 7">
+            <a:extLst>
+              <a:ext uri="{FF2B5EF4-FFF2-40B4-BE49-F238E27FC236}">
+                <a16:creationId xmlns:a16="http://schemas.microsoft.com/office/drawing/2014/main" id="{485C3421-15E6-4E40-A96D-A08A268F87C2}"/>
+              </a:ext>
+            </a:extLst>
+          </p:cNvPr>
+          <p:cNvCxnSpPr>
+            <a:cxnSpLocks/>
+          </p:cNvCxnSpPr>
+          <p:nvPr/>
+        </p:nvCxnSpPr>
+        <p:spPr>
+          <a:xfrm>
+            <a:off x="3899303" y="3957965"/>
+            <a:ext cx="4195925" cy="0"/>
+          </a:xfrm>
+          <a:prstGeom prst="straightConnector1">
+            <a:avLst/>
+          </a:prstGeom>
+          <a:ln w="76200">
+            <a:solidFill>
+              <a:schemeClr val="tx1"/>
+            </a:solidFill>
+            <a:tailEnd type="triangle"/>
+          </a:ln>
+        </p:spPr>
+        <p:style>
+          <a:lnRef idx="1">
+            <a:schemeClr val="accent1"/>
+          </a:lnRef>
+          <a:fillRef idx="0">
+            <a:schemeClr val="accent1"/>
+          </a:fillRef>
+          <a:effectRef idx="0">
+            <a:schemeClr val="accent1"/>
+          </a:effectRef>
+          <a:fontRef idx="minor">
+            <a:schemeClr val="tx1"/>
+          </a:fontRef>
+        </p:style>
+      </p:cxnSp>
+      <p:sp>
+        <p:nvSpPr>
+          <p:cNvPr id="9" name="TextBox 8">
+            <a:extLst>
+              <a:ext uri="{FF2B5EF4-FFF2-40B4-BE49-F238E27FC236}">
+                <a16:creationId xmlns:a16="http://schemas.microsoft.com/office/drawing/2014/main" id="{FD9CF7D9-BBDF-984A-A052-49F961DB5C60}"/>
+              </a:ext>
+            </a:extLst>
+          </p:cNvPr>
+          <p:cNvSpPr txBox="1"/>
+          <p:nvPr/>
+        </p:nvSpPr>
+        <p:spPr>
+          <a:xfrm>
+            <a:off x="8240726" y="3758369"/>
+            <a:ext cx="614271" cy="369332"/>
+          </a:xfrm>
+          <a:prstGeom prst="rect">
+            <a:avLst/>
+          </a:prstGeom>
+          <a:noFill/>
+        </p:spPr>
+        <p:txBody>
+          <a:bodyPr wrap="square" rtlCol="0">
+            <a:spAutoFit/>
+          </a:bodyPr>
+          <a:lstStyle/>
+          <a:p>
+            <a:r>
+              <a:rPr lang="en-US" dirty="0"/>
+              <a:t>time</a:t>
+            </a:r>
+          </a:p>
+        </p:txBody>
+      </p:sp>
+      <p:sp>
+        <p:nvSpPr>
+          <p:cNvPr id="10" name="TextBox 9">
+            <a:extLst>
+              <a:ext uri="{FF2B5EF4-FFF2-40B4-BE49-F238E27FC236}">
+                <a16:creationId xmlns:a16="http://schemas.microsoft.com/office/drawing/2014/main" id="{87D4E0A9-E8B4-744F-B2E5-A5B306E35864}"/>
+              </a:ext>
+            </a:extLst>
+          </p:cNvPr>
+          <p:cNvSpPr txBox="1"/>
+          <p:nvPr/>
+        </p:nvSpPr>
+        <p:spPr>
+          <a:xfrm>
+            <a:off x="5009420" y="3517294"/>
+            <a:ext cx="2173159" cy="338554"/>
+          </a:xfrm>
+          <a:prstGeom prst="rect">
+            <a:avLst/>
+          </a:prstGeom>
+          <a:noFill/>
+        </p:spPr>
+        <p:txBody>
+          <a:bodyPr wrap="none" rtlCol="0">
+            <a:spAutoFit/>
+          </a:bodyPr>
+          <a:lstStyle/>
+          <a:p>
+            <a:pPr algn="ctr"/>
+            <a:r>
+              <a:rPr lang="en-US" sz="1600" dirty="0">
+                <a:solidFill>
+                  <a:srgbClr val="0070C0"/>
+                </a:solidFill>
+              </a:rPr>
+              <a:t>Window of Opportunity</a:t>
+            </a:r>
+          </a:p>
+        </p:txBody>
+      </p:sp>
+    </p:spTree>
+    <p:extLst>
+      <p:ext uri="{BB962C8B-B14F-4D97-AF65-F5344CB8AC3E}">
+        <p14:creationId xmlns:p14="http://schemas.microsoft.com/office/powerpoint/2010/main" val="745422093"/>
+      </p:ext>
+    </p:extLst>
+  </p:cSld>
+  <p:clrMapOvr>
+    <a:masterClrMapping/>
+  </p:clrMapOvr>
+</p:sld>
+</file>
+
+<file path=ppt/slides/slide3.xml><?xml version="1.0" encoding="utf-8"?>
+<p:sld xmlns:a="http://schemas.openxmlformats.org/drawingml/2006/main" xmlns:r="http://schemas.openxmlformats.org/officeDocument/2006/relationships" xmlns:p="http://schemas.openxmlformats.org/presentationml/2006/main">
+  <p:cSld>
+    <p:spTree>
+      <p:nvGrpSpPr>
+        <p:cNvPr id="1" name=""/>
+        <p:cNvGrpSpPr/>
+        <p:nvPr/>
+      </p:nvGrpSpPr>
+      <p:grpSpPr>
+        <a:xfrm>
+          <a:off x="0" y="0"/>
+          <a:ext cx="0" cy="0"/>
+          <a:chOff x="0" y="0"/>
+          <a:chExt cx="0" cy="0"/>
+        </a:xfrm>
+      </p:grpSpPr>
+      <p:sp>
+        <p:nvSpPr>
           <p:cNvPr id="2" name="Title 1"/>
           <p:cNvSpPr>
             <a:spLocks noGrp="1"/>
@@ -3526,7 +3863,7 @@
             <a:fld id="{778F18BF-4499-417F-8F6D-1731EA96DFFC}" type="slidenum">
               <a:rPr lang="en-US"/>
               <a:pPr/>
-              <a:t>2</a:t>
+              <a:t>3</a:t>
             </a:fld>
             <a:endParaRPr lang="en-US"/>
           </a:p>
@@ -5814,7 +6151,7 @@
 </p:sld>
 </file>
 
-<file path=ppt/slides/slide3.xml><?xml version="1.0" encoding="utf-8"?>
+<file path=ppt/slides/slide4.xml><?xml version="1.0" encoding="utf-8"?>
 <p:sld xmlns:a="http://schemas.openxmlformats.org/drawingml/2006/main" xmlns:r="http://schemas.openxmlformats.org/officeDocument/2006/relationships" xmlns:p="http://schemas.openxmlformats.org/presentationml/2006/main">
   <p:cSld>
     <p:spTree>
@@ -5900,7 +6237,7 @@
             <a:fld id="{07FCC8A9-3E14-465E-9E9F-2C3E4C679BA9}" type="slidenum">
               <a:rPr lang="en-US" smtClean="0"/>
               <a:pPr/>
-              <a:t>3</a:t>
+              <a:t>4</a:t>
             </a:fld>
             <a:endParaRPr lang="en-US"/>
           </a:p>
@@ -6757,7 +7094,7 @@
 </p:sld>
 </file>
 
-<file path=ppt/slides/slide4.xml><?xml version="1.0" encoding="utf-8"?>
+<file path=ppt/slides/slide5.xml><?xml version="1.0" encoding="utf-8"?>
 <p:sld xmlns:a="http://schemas.openxmlformats.org/drawingml/2006/main" xmlns:r="http://schemas.openxmlformats.org/officeDocument/2006/relationships" xmlns:p="http://schemas.openxmlformats.org/presentationml/2006/main">
   <p:cSld>
     <p:spTree>
@@ -6877,7 +7214,9 @@
           </a:xfrm>
         </p:spPr>
         <p:txBody>
-          <a:bodyPr/>
+          <a:bodyPr>
+            <a:normAutofit fontScale="77500" lnSpcReduction="20000"/>
+          </a:bodyPr>
           <a:lstStyle/>
           <a:p>
             <a:endParaRPr lang="en-US"/>

</xml_diff>

<commit_message>
Deployed 4bba062 with MkDocs version: 1.1.2
</commit_message>
<xml_diff>
--- a/presentations/ekg-book-figures.pptx
+++ b/presentations/ekg-book-figures.pptx
@@ -10,6 +10,7 @@
     <p:sldId id="257" r:id="rId4"/>
     <p:sldId id="264" r:id="rId5"/>
     <p:sldId id="265" r:id="rId6"/>
+    <p:sldId id="267" r:id="rId7"/>
   </p:sldIdLst>
   <p:sldSz cx="12192000" cy="6858000"/>
   <p:notesSz cx="6858000" cy="9144000"/>
@@ -263,7 +264,7 @@
           <a:p>
             <a:fld id="{7630FDF3-D00D-A441-A947-E101982E9206}" type="datetimeFigureOut">
               <a:rPr lang="en-US" smtClean="0"/>
-              <a:t>12/27/20</a:t>
+              <a:t>2/2/21</a:t>
             </a:fld>
             <a:endParaRPr lang="en-US"/>
           </a:p>
@@ -461,7 +462,7 @@
           <a:p>
             <a:fld id="{7630FDF3-D00D-A441-A947-E101982E9206}" type="datetimeFigureOut">
               <a:rPr lang="en-US" smtClean="0"/>
-              <a:t>12/27/20</a:t>
+              <a:t>2/2/21</a:t>
             </a:fld>
             <a:endParaRPr lang="en-US"/>
           </a:p>
@@ -669,7 +670,7 @@
           <a:p>
             <a:fld id="{7630FDF3-D00D-A441-A947-E101982E9206}" type="datetimeFigureOut">
               <a:rPr lang="en-US" smtClean="0"/>
-              <a:t>12/27/20</a:t>
+              <a:t>2/2/21</a:t>
             </a:fld>
             <a:endParaRPr lang="en-US"/>
           </a:p>
@@ -867,7 +868,7 @@
           <a:p>
             <a:fld id="{7630FDF3-D00D-A441-A947-E101982E9206}" type="datetimeFigureOut">
               <a:rPr lang="en-US" smtClean="0"/>
-              <a:t>12/27/20</a:t>
+              <a:t>2/2/21</a:t>
             </a:fld>
             <a:endParaRPr lang="en-US"/>
           </a:p>
@@ -1142,7 +1143,7 @@
           <a:p>
             <a:fld id="{7630FDF3-D00D-A441-A947-E101982E9206}" type="datetimeFigureOut">
               <a:rPr lang="en-US" smtClean="0"/>
-              <a:t>12/27/20</a:t>
+              <a:t>2/2/21</a:t>
             </a:fld>
             <a:endParaRPr lang="en-US"/>
           </a:p>
@@ -1407,7 +1408,7 @@
           <a:p>
             <a:fld id="{7630FDF3-D00D-A441-A947-E101982E9206}" type="datetimeFigureOut">
               <a:rPr lang="en-US" smtClean="0"/>
-              <a:t>12/27/20</a:t>
+              <a:t>2/2/21</a:t>
             </a:fld>
             <a:endParaRPr lang="en-US"/>
           </a:p>
@@ -1819,7 +1820,7 @@
           <a:p>
             <a:fld id="{7630FDF3-D00D-A441-A947-E101982E9206}" type="datetimeFigureOut">
               <a:rPr lang="en-US" smtClean="0"/>
-              <a:t>12/27/20</a:t>
+              <a:t>2/2/21</a:t>
             </a:fld>
             <a:endParaRPr lang="en-US"/>
           </a:p>
@@ -1960,7 +1961,7 @@
           <a:p>
             <a:fld id="{7630FDF3-D00D-A441-A947-E101982E9206}" type="datetimeFigureOut">
               <a:rPr lang="en-US" smtClean="0"/>
-              <a:t>12/27/20</a:t>
+              <a:t>2/2/21</a:t>
             </a:fld>
             <a:endParaRPr lang="en-US"/>
           </a:p>
@@ -2073,7 +2074,7 @@
           <a:p>
             <a:fld id="{7630FDF3-D00D-A441-A947-E101982E9206}" type="datetimeFigureOut">
               <a:rPr lang="en-US" smtClean="0"/>
-              <a:t>12/27/20</a:t>
+              <a:t>2/2/21</a:t>
             </a:fld>
             <a:endParaRPr lang="en-US"/>
           </a:p>
@@ -2384,7 +2385,7 @@
           <a:p>
             <a:fld id="{7630FDF3-D00D-A441-A947-E101982E9206}" type="datetimeFigureOut">
               <a:rPr lang="en-US" smtClean="0"/>
-              <a:t>12/27/20</a:t>
+              <a:t>2/2/21</a:t>
             </a:fld>
             <a:endParaRPr lang="en-US"/>
           </a:p>
@@ -2672,7 +2673,7 @@
           <a:p>
             <a:fld id="{7630FDF3-D00D-A441-A947-E101982E9206}" type="datetimeFigureOut">
               <a:rPr lang="en-US" smtClean="0"/>
-              <a:t>12/27/20</a:t>
+              <a:t>2/2/21</a:t>
             </a:fld>
             <a:endParaRPr lang="en-US"/>
           </a:p>
@@ -2913,7 +2914,7 @@
           <a:p>
             <a:fld id="{7630FDF3-D00D-A441-A947-E101982E9206}" type="datetimeFigureOut">
               <a:rPr lang="en-US" smtClean="0"/>
-              <a:t>12/27/20</a:t>
+              <a:t>2/2/21</a:t>
             </a:fld>
             <a:endParaRPr lang="en-US"/>
           </a:p>
@@ -8641,6 +8642,2167 @@
 </p:sld>
 </file>
 
+<file path=ppt/slides/slide6.xml><?xml version="1.0" encoding="utf-8"?>
+<p:sld xmlns:a="http://schemas.openxmlformats.org/drawingml/2006/main" xmlns:r="http://schemas.openxmlformats.org/officeDocument/2006/relationships" xmlns:p="http://schemas.openxmlformats.org/presentationml/2006/main">
+  <p:cSld>
+    <p:spTree>
+      <p:nvGrpSpPr>
+        <p:cNvPr id="1" name=""/>
+        <p:cNvGrpSpPr/>
+        <p:nvPr/>
+      </p:nvGrpSpPr>
+      <p:grpSpPr>
+        <a:xfrm>
+          <a:off x="0" y="0"/>
+          <a:ext cx="0" cy="0"/>
+          <a:chOff x="0" y="0"/>
+          <a:chExt cx="0" cy="0"/>
+        </a:xfrm>
+      </p:grpSpPr>
+      <p:grpSp>
+        <p:nvGrpSpPr>
+          <p:cNvPr id="15" name="Group 14">
+            <a:extLst>
+              <a:ext uri="{FF2B5EF4-FFF2-40B4-BE49-F238E27FC236}">
+                <a16:creationId xmlns:a16="http://schemas.microsoft.com/office/drawing/2014/main" id="{09ECA544-977B-804C-9570-057B89012E51}"/>
+              </a:ext>
+            </a:extLst>
+          </p:cNvPr>
+          <p:cNvGrpSpPr/>
+          <p:nvPr/>
+        </p:nvGrpSpPr>
+        <p:grpSpPr>
+          <a:xfrm>
+            <a:off x="566773" y="892367"/>
+            <a:ext cx="3988106" cy="4022332"/>
+            <a:chOff x="566773" y="892367"/>
+            <a:chExt cx="3988106" cy="4022332"/>
+          </a:xfrm>
+        </p:grpSpPr>
+        <p:sp>
+          <p:nvSpPr>
+            <p:cNvPr id="4" name="Cloud Callout 3">
+              <a:extLst>
+                <a:ext uri="{FF2B5EF4-FFF2-40B4-BE49-F238E27FC236}">
+                  <a16:creationId xmlns:a16="http://schemas.microsoft.com/office/drawing/2014/main" id="{2DE69A42-D9E1-3241-B499-1AD9230D1874}"/>
+                </a:ext>
+              </a:extLst>
+            </p:cNvPr>
+            <p:cNvSpPr/>
+            <p:nvPr/>
+          </p:nvSpPr>
+          <p:spPr>
+            <a:xfrm>
+              <a:off x="566773" y="892367"/>
+              <a:ext cx="3988106" cy="3167751"/>
+            </a:xfrm>
+            <a:prstGeom prst="cloudCallout">
+              <a:avLst>
+                <a:gd name="adj1" fmla="val -17448"/>
+                <a:gd name="adj2" fmla="val 72897"/>
+              </a:avLst>
+            </a:prstGeom>
+            <a:solidFill>
+              <a:schemeClr val="bg1">
+                <a:lumMod val="75000"/>
+              </a:schemeClr>
+            </a:solidFill>
+            <a:ln>
+              <a:solidFill>
+                <a:schemeClr val="tx1"/>
+              </a:solidFill>
+            </a:ln>
+          </p:spPr>
+          <p:style>
+            <a:lnRef idx="2">
+              <a:schemeClr val="accent1">
+                <a:shade val="50000"/>
+              </a:schemeClr>
+            </a:lnRef>
+            <a:fillRef idx="1">
+              <a:schemeClr val="accent1"/>
+            </a:fillRef>
+            <a:effectRef idx="0">
+              <a:schemeClr val="accent1"/>
+            </a:effectRef>
+            <a:fontRef idx="minor">
+              <a:schemeClr val="lt1"/>
+            </a:fontRef>
+          </p:style>
+          <p:txBody>
+            <a:bodyPr rtlCol="0" anchor="ctr"/>
+            <a:lstStyle/>
+            <a:p>
+              <a:pPr algn="ctr"/>
+              <a:endParaRPr lang="en-US"/>
+            </a:p>
+          </p:txBody>
+        </p:sp>
+        <p:sp>
+          <p:nvSpPr>
+            <p:cNvPr id="5" name="TextBox 4">
+              <a:extLst>
+                <a:ext uri="{FF2B5EF4-FFF2-40B4-BE49-F238E27FC236}">
+                  <a16:creationId xmlns:a16="http://schemas.microsoft.com/office/drawing/2014/main" id="{10925D02-AD03-7549-8533-7CF555F3F2F2}"/>
+                </a:ext>
+              </a:extLst>
+            </p:cNvPr>
+            <p:cNvSpPr txBox="1"/>
+            <p:nvPr/>
+          </p:nvSpPr>
+          <p:spPr>
+            <a:xfrm>
+              <a:off x="1128254" y="1740918"/>
+              <a:ext cx="2865143" cy="923330"/>
+            </a:xfrm>
+            <a:prstGeom prst="rect">
+              <a:avLst/>
+            </a:prstGeom>
+            <a:noFill/>
+          </p:spPr>
+          <p:txBody>
+            <a:bodyPr wrap="none" rtlCol="0">
+              <a:spAutoFit/>
+            </a:bodyPr>
+            <a:lstStyle/>
+            <a:p>
+              <a:pPr algn="ctr"/>
+              <a:r>
+                <a:rPr lang="en-US" dirty="0"/>
+                <a:t>Concepts</a:t>
+              </a:r>
+            </a:p>
+            <a:p>
+              <a:pPr algn="ctr"/>
+              <a:r>
+                <a:rPr lang="en-US" dirty="0"/>
+                <a:t>Already Modeled in the</a:t>
+              </a:r>
+            </a:p>
+            <a:p>
+              <a:pPr algn="ctr"/>
+              <a:r>
+                <a:rPr lang="en-US" dirty="0"/>
+                <a:t>Enterprise Knowledge Graph</a:t>
+              </a:r>
+            </a:p>
+          </p:txBody>
+        </p:sp>
+        <p:sp>
+          <p:nvSpPr>
+            <p:cNvPr id="7" name="Oval 6">
+              <a:extLst>
+                <a:ext uri="{FF2B5EF4-FFF2-40B4-BE49-F238E27FC236}">
+                  <a16:creationId xmlns:a16="http://schemas.microsoft.com/office/drawing/2014/main" id="{0A22B88C-67B6-A24A-89F8-31ED77C540F6}"/>
+                </a:ext>
+              </a:extLst>
+            </p:cNvPr>
+            <p:cNvSpPr/>
+            <p:nvPr/>
+          </p:nvSpPr>
+          <p:spPr>
+            <a:xfrm rot="1712555">
+              <a:off x="1566544" y="3903389"/>
+              <a:ext cx="731520" cy="1011310"/>
+            </a:xfrm>
+            <a:prstGeom prst="ellipse">
+              <a:avLst/>
+            </a:prstGeom>
+            <a:solidFill>
+              <a:schemeClr val="bg1"/>
+            </a:solidFill>
+            <a:ln>
+              <a:noFill/>
+            </a:ln>
+          </p:spPr>
+          <p:style>
+            <a:lnRef idx="2">
+              <a:schemeClr val="accent1">
+                <a:shade val="50000"/>
+              </a:schemeClr>
+            </a:lnRef>
+            <a:fillRef idx="1">
+              <a:schemeClr val="accent1"/>
+            </a:fillRef>
+            <a:effectRef idx="0">
+              <a:schemeClr val="accent1"/>
+            </a:effectRef>
+            <a:fontRef idx="minor">
+              <a:schemeClr val="lt1"/>
+            </a:fontRef>
+          </p:style>
+          <p:txBody>
+            <a:bodyPr rtlCol="0" anchor="ctr"/>
+            <a:lstStyle/>
+            <a:p>
+              <a:pPr algn="ctr"/>
+              <a:endParaRPr lang="en-US"/>
+            </a:p>
+          </p:txBody>
+        </p:sp>
+      </p:grpSp>
+      <p:sp>
+        <p:nvSpPr>
+          <p:cNvPr id="16" name="Freeform 15">
+            <a:extLst>
+              <a:ext uri="{FF2B5EF4-FFF2-40B4-BE49-F238E27FC236}">
+                <a16:creationId xmlns:a16="http://schemas.microsoft.com/office/drawing/2014/main" id="{1BCDE68F-0027-9B46-A78F-6EA0A9BC1130}"/>
+              </a:ext>
+            </a:extLst>
+          </p:cNvPr>
+          <p:cNvSpPr/>
+          <p:nvPr/>
+        </p:nvSpPr>
+        <p:spPr>
+          <a:xfrm>
+            <a:off x="1814466" y="1349510"/>
+            <a:ext cx="4580982" cy="3955686"/>
+          </a:xfrm>
+          <a:custGeom>
+            <a:avLst/>
+            <a:gdLst>
+              <a:gd name="connsiteX0" fmla="*/ 3729081 w 4585877"/>
+              <a:gd name="connsiteY0" fmla="*/ 313827 h 3962444"/>
+              <a:gd name="connsiteX1" fmla="*/ 3119481 w 4585877"/>
+              <a:gd name="connsiteY1" fmla="*/ 1184684 h 3962444"/>
+              <a:gd name="connsiteX2" fmla="*/ 2327001 w 4585877"/>
+              <a:gd name="connsiteY2" fmla="*/ 2003290 h 3962444"/>
+              <a:gd name="connsiteX3" fmla="*/ 1412601 w 4585877"/>
+              <a:gd name="connsiteY3" fmla="*/ 2699976 h 3962444"/>
+              <a:gd name="connsiteX4" fmla="*/ 437241 w 4585877"/>
+              <a:gd name="connsiteY4" fmla="*/ 3109279 h 3962444"/>
+              <a:gd name="connsiteX5" fmla="*/ 1813 w 4585877"/>
+              <a:gd name="connsiteY5" fmla="*/ 3448913 h 3962444"/>
+              <a:gd name="connsiteX6" fmla="*/ 271779 w 4585877"/>
+              <a:gd name="connsiteY6" fmla="*/ 3535999 h 3962444"/>
+              <a:gd name="connsiteX7" fmla="*/ 10521 w 4585877"/>
+              <a:gd name="connsiteY7" fmla="*/ 3901759 h 3962444"/>
+              <a:gd name="connsiteX8" fmla="*/ 480784 w 4585877"/>
+              <a:gd name="connsiteY8" fmla="*/ 3901759 h 3962444"/>
+              <a:gd name="connsiteX9" fmla="*/ 1795779 w 4585877"/>
+              <a:gd name="connsiteY9" fmla="*/ 3309576 h 3962444"/>
+              <a:gd name="connsiteX10" fmla="*/ 3058521 w 4585877"/>
+              <a:gd name="connsiteY10" fmla="*/ 2438719 h 3962444"/>
+              <a:gd name="connsiteX11" fmla="*/ 3833584 w 4585877"/>
+              <a:gd name="connsiteY11" fmla="*/ 1681073 h 3962444"/>
+              <a:gd name="connsiteX12" fmla="*/ 4347390 w 4585877"/>
+              <a:gd name="connsiteY12" fmla="*/ 949553 h 3962444"/>
+              <a:gd name="connsiteX13" fmla="*/ 4556396 w 4585877"/>
+              <a:gd name="connsiteY13" fmla="*/ 418330 h 3962444"/>
+              <a:gd name="connsiteX14" fmla="*/ 4556396 w 4585877"/>
+              <a:gd name="connsiteY14" fmla="*/ 26444 h 3962444"/>
+              <a:gd name="connsiteX15" fmla="*/ 4295139 w 4585877"/>
+              <a:gd name="connsiteY15" fmla="*/ 235450 h 3962444"/>
+              <a:gd name="connsiteX16" fmla="*/ 4216761 w 4585877"/>
+              <a:gd name="connsiteY16" fmla="*/ 61279 h 3962444"/>
+              <a:gd name="connsiteX17" fmla="*/ 4042590 w 4585877"/>
+              <a:gd name="connsiteY17" fmla="*/ 235450 h 3962444"/>
+              <a:gd name="connsiteX18" fmla="*/ 3894544 w 4585877"/>
+              <a:gd name="connsiteY18" fmla="*/ 319 h 3962444"/>
+              <a:gd name="connsiteX19" fmla="*/ 3729081 w 4585877"/>
+              <a:gd name="connsiteY19" fmla="*/ 313827 h 3962444"/>
+              <a:gd name="connsiteX0" fmla="*/ 3721501 w 4578297"/>
+              <a:gd name="connsiteY0" fmla="*/ 313827 h 3962444"/>
+              <a:gd name="connsiteX1" fmla="*/ 3111901 w 4578297"/>
+              <a:gd name="connsiteY1" fmla="*/ 1184684 h 3962444"/>
+              <a:gd name="connsiteX2" fmla="*/ 2319421 w 4578297"/>
+              <a:gd name="connsiteY2" fmla="*/ 2003290 h 3962444"/>
+              <a:gd name="connsiteX3" fmla="*/ 1405021 w 4578297"/>
+              <a:gd name="connsiteY3" fmla="*/ 2699976 h 3962444"/>
+              <a:gd name="connsiteX4" fmla="*/ 429661 w 4578297"/>
+              <a:gd name="connsiteY4" fmla="*/ 3109279 h 3962444"/>
+              <a:gd name="connsiteX5" fmla="*/ 63901 w 4578297"/>
+              <a:gd name="connsiteY5" fmla="*/ 3353119 h 3962444"/>
+              <a:gd name="connsiteX6" fmla="*/ 264199 w 4578297"/>
+              <a:gd name="connsiteY6" fmla="*/ 3535999 h 3962444"/>
+              <a:gd name="connsiteX7" fmla="*/ 2941 w 4578297"/>
+              <a:gd name="connsiteY7" fmla="*/ 3901759 h 3962444"/>
+              <a:gd name="connsiteX8" fmla="*/ 473204 w 4578297"/>
+              <a:gd name="connsiteY8" fmla="*/ 3901759 h 3962444"/>
+              <a:gd name="connsiteX9" fmla="*/ 1788199 w 4578297"/>
+              <a:gd name="connsiteY9" fmla="*/ 3309576 h 3962444"/>
+              <a:gd name="connsiteX10" fmla="*/ 3050941 w 4578297"/>
+              <a:gd name="connsiteY10" fmla="*/ 2438719 h 3962444"/>
+              <a:gd name="connsiteX11" fmla="*/ 3826004 w 4578297"/>
+              <a:gd name="connsiteY11" fmla="*/ 1681073 h 3962444"/>
+              <a:gd name="connsiteX12" fmla="*/ 4339810 w 4578297"/>
+              <a:gd name="connsiteY12" fmla="*/ 949553 h 3962444"/>
+              <a:gd name="connsiteX13" fmla="*/ 4548816 w 4578297"/>
+              <a:gd name="connsiteY13" fmla="*/ 418330 h 3962444"/>
+              <a:gd name="connsiteX14" fmla="*/ 4548816 w 4578297"/>
+              <a:gd name="connsiteY14" fmla="*/ 26444 h 3962444"/>
+              <a:gd name="connsiteX15" fmla="*/ 4287559 w 4578297"/>
+              <a:gd name="connsiteY15" fmla="*/ 235450 h 3962444"/>
+              <a:gd name="connsiteX16" fmla="*/ 4209181 w 4578297"/>
+              <a:gd name="connsiteY16" fmla="*/ 61279 h 3962444"/>
+              <a:gd name="connsiteX17" fmla="*/ 4035010 w 4578297"/>
+              <a:gd name="connsiteY17" fmla="*/ 235450 h 3962444"/>
+              <a:gd name="connsiteX18" fmla="*/ 3886964 w 4578297"/>
+              <a:gd name="connsiteY18" fmla="*/ 319 h 3962444"/>
+              <a:gd name="connsiteX19" fmla="*/ 3721501 w 4578297"/>
+              <a:gd name="connsiteY19" fmla="*/ 313827 h 3962444"/>
+              <a:gd name="connsiteX0" fmla="*/ 3724275 w 4581071"/>
+              <a:gd name="connsiteY0" fmla="*/ 313827 h 3955686"/>
+              <a:gd name="connsiteX1" fmla="*/ 3114675 w 4581071"/>
+              <a:gd name="connsiteY1" fmla="*/ 1184684 h 3955686"/>
+              <a:gd name="connsiteX2" fmla="*/ 2322195 w 4581071"/>
+              <a:gd name="connsiteY2" fmla="*/ 2003290 h 3955686"/>
+              <a:gd name="connsiteX3" fmla="*/ 1407795 w 4581071"/>
+              <a:gd name="connsiteY3" fmla="*/ 2699976 h 3955686"/>
+              <a:gd name="connsiteX4" fmla="*/ 432435 w 4581071"/>
+              <a:gd name="connsiteY4" fmla="*/ 3109279 h 3955686"/>
+              <a:gd name="connsiteX5" fmla="*/ 66675 w 4581071"/>
+              <a:gd name="connsiteY5" fmla="*/ 3353119 h 3955686"/>
+              <a:gd name="connsiteX6" fmla="*/ 206013 w 4581071"/>
+              <a:gd name="connsiteY6" fmla="*/ 3666627 h 3955686"/>
+              <a:gd name="connsiteX7" fmla="*/ 5715 w 4581071"/>
+              <a:gd name="connsiteY7" fmla="*/ 3901759 h 3955686"/>
+              <a:gd name="connsiteX8" fmla="*/ 475978 w 4581071"/>
+              <a:gd name="connsiteY8" fmla="*/ 3901759 h 3955686"/>
+              <a:gd name="connsiteX9" fmla="*/ 1790973 w 4581071"/>
+              <a:gd name="connsiteY9" fmla="*/ 3309576 h 3955686"/>
+              <a:gd name="connsiteX10" fmla="*/ 3053715 w 4581071"/>
+              <a:gd name="connsiteY10" fmla="*/ 2438719 h 3955686"/>
+              <a:gd name="connsiteX11" fmla="*/ 3828778 w 4581071"/>
+              <a:gd name="connsiteY11" fmla="*/ 1681073 h 3955686"/>
+              <a:gd name="connsiteX12" fmla="*/ 4342584 w 4581071"/>
+              <a:gd name="connsiteY12" fmla="*/ 949553 h 3955686"/>
+              <a:gd name="connsiteX13" fmla="*/ 4551590 w 4581071"/>
+              <a:gd name="connsiteY13" fmla="*/ 418330 h 3955686"/>
+              <a:gd name="connsiteX14" fmla="*/ 4551590 w 4581071"/>
+              <a:gd name="connsiteY14" fmla="*/ 26444 h 3955686"/>
+              <a:gd name="connsiteX15" fmla="*/ 4290333 w 4581071"/>
+              <a:gd name="connsiteY15" fmla="*/ 235450 h 3955686"/>
+              <a:gd name="connsiteX16" fmla="*/ 4211955 w 4581071"/>
+              <a:gd name="connsiteY16" fmla="*/ 61279 h 3955686"/>
+              <a:gd name="connsiteX17" fmla="*/ 4037784 w 4581071"/>
+              <a:gd name="connsiteY17" fmla="*/ 235450 h 3955686"/>
+              <a:gd name="connsiteX18" fmla="*/ 3889738 w 4581071"/>
+              <a:gd name="connsiteY18" fmla="*/ 319 h 3955686"/>
+              <a:gd name="connsiteX19" fmla="*/ 3724275 w 4581071"/>
+              <a:gd name="connsiteY19" fmla="*/ 313827 h 3955686"/>
+              <a:gd name="connsiteX0" fmla="*/ 3723358 w 4580154"/>
+              <a:gd name="connsiteY0" fmla="*/ 313827 h 3955686"/>
+              <a:gd name="connsiteX1" fmla="*/ 3113758 w 4580154"/>
+              <a:gd name="connsiteY1" fmla="*/ 1184684 h 3955686"/>
+              <a:gd name="connsiteX2" fmla="*/ 2321278 w 4580154"/>
+              <a:gd name="connsiteY2" fmla="*/ 2003290 h 3955686"/>
+              <a:gd name="connsiteX3" fmla="*/ 1406878 w 4580154"/>
+              <a:gd name="connsiteY3" fmla="*/ 2699976 h 3955686"/>
+              <a:gd name="connsiteX4" fmla="*/ 431518 w 4580154"/>
+              <a:gd name="connsiteY4" fmla="*/ 3109279 h 3955686"/>
+              <a:gd name="connsiteX5" fmla="*/ 65758 w 4580154"/>
+              <a:gd name="connsiteY5" fmla="*/ 3353119 h 3955686"/>
+              <a:gd name="connsiteX6" fmla="*/ 205096 w 4580154"/>
+              <a:gd name="connsiteY6" fmla="*/ 3666627 h 3955686"/>
+              <a:gd name="connsiteX7" fmla="*/ 4798 w 4580154"/>
+              <a:gd name="connsiteY7" fmla="*/ 3901759 h 3955686"/>
+              <a:gd name="connsiteX8" fmla="*/ 475061 w 4580154"/>
+              <a:gd name="connsiteY8" fmla="*/ 3901759 h 3955686"/>
+              <a:gd name="connsiteX9" fmla="*/ 1790056 w 4580154"/>
+              <a:gd name="connsiteY9" fmla="*/ 3309576 h 3955686"/>
+              <a:gd name="connsiteX10" fmla="*/ 3052798 w 4580154"/>
+              <a:gd name="connsiteY10" fmla="*/ 2438719 h 3955686"/>
+              <a:gd name="connsiteX11" fmla="*/ 3827861 w 4580154"/>
+              <a:gd name="connsiteY11" fmla="*/ 1681073 h 3955686"/>
+              <a:gd name="connsiteX12" fmla="*/ 4341667 w 4580154"/>
+              <a:gd name="connsiteY12" fmla="*/ 949553 h 3955686"/>
+              <a:gd name="connsiteX13" fmla="*/ 4550673 w 4580154"/>
+              <a:gd name="connsiteY13" fmla="*/ 418330 h 3955686"/>
+              <a:gd name="connsiteX14" fmla="*/ 4550673 w 4580154"/>
+              <a:gd name="connsiteY14" fmla="*/ 26444 h 3955686"/>
+              <a:gd name="connsiteX15" fmla="*/ 4289416 w 4580154"/>
+              <a:gd name="connsiteY15" fmla="*/ 235450 h 3955686"/>
+              <a:gd name="connsiteX16" fmla="*/ 4211038 w 4580154"/>
+              <a:gd name="connsiteY16" fmla="*/ 61279 h 3955686"/>
+              <a:gd name="connsiteX17" fmla="*/ 4036867 w 4580154"/>
+              <a:gd name="connsiteY17" fmla="*/ 235450 h 3955686"/>
+              <a:gd name="connsiteX18" fmla="*/ 3888821 w 4580154"/>
+              <a:gd name="connsiteY18" fmla="*/ 319 h 3955686"/>
+              <a:gd name="connsiteX19" fmla="*/ 3723358 w 4580154"/>
+              <a:gd name="connsiteY19" fmla="*/ 313827 h 3955686"/>
+              <a:gd name="connsiteX0" fmla="*/ 3723358 w 4580154"/>
+              <a:gd name="connsiteY0" fmla="*/ 313827 h 3955686"/>
+              <a:gd name="connsiteX1" fmla="*/ 3113758 w 4580154"/>
+              <a:gd name="connsiteY1" fmla="*/ 1184684 h 3955686"/>
+              <a:gd name="connsiteX2" fmla="*/ 2321278 w 4580154"/>
+              <a:gd name="connsiteY2" fmla="*/ 2003290 h 3955686"/>
+              <a:gd name="connsiteX3" fmla="*/ 1406878 w 4580154"/>
+              <a:gd name="connsiteY3" fmla="*/ 2699976 h 3955686"/>
+              <a:gd name="connsiteX4" fmla="*/ 431518 w 4580154"/>
+              <a:gd name="connsiteY4" fmla="*/ 3109279 h 3955686"/>
+              <a:gd name="connsiteX5" fmla="*/ 152843 w 4580154"/>
+              <a:gd name="connsiteY5" fmla="*/ 3248616 h 3955686"/>
+              <a:gd name="connsiteX6" fmla="*/ 65758 w 4580154"/>
+              <a:gd name="connsiteY6" fmla="*/ 3353119 h 3955686"/>
+              <a:gd name="connsiteX7" fmla="*/ 205096 w 4580154"/>
+              <a:gd name="connsiteY7" fmla="*/ 3666627 h 3955686"/>
+              <a:gd name="connsiteX8" fmla="*/ 4798 w 4580154"/>
+              <a:gd name="connsiteY8" fmla="*/ 3901759 h 3955686"/>
+              <a:gd name="connsiteX9" fmla="*/ 475061 w 4580154"/>
+              <a:gd name="connsiteY9" fmla="*/ 3901759 h 3955686"/>
+              <a:gd name="connsiteX10" fmla="*/ 1790056 w 4580154"/>
+              <a:gd name="connsiteY10" fmla="*/ 3309576 h 3955686"/>
+              <a:gd name="connsiteX11" fmla="*/ 3052798 w 4580154"/>
+              <a:gd name="connsiteY11" fmla="*/ 2438719 h 3955686"/>
+              <a:gd name="connsiteX12" fmla="*/ 3827861 w 4580154"/>
+              <a:gd name="connsiteY12" fmla="*/ 1681073 h 3955686"/>
+              <a:gd name="connsiteX13" fmla="*/ 4341667 w 4580154"/>
+              <a:gd name="connsiteY13" fmla="*/ 949553 h 3955686"/>
+              <a:gd name="connsiteX14" fmla="*/ 4550673 w 4580154"/>
+              <a:gd name="connsiteY14" fmla="*/ 418330 h 3955686"/>
+              <a:gd name="connsiteX15" fmla="*/ 4550673 w 4580154"/>
+              <a:gd name="connsiteY15" fmla="*/ 26444 h 3955686"/>
+              <a:gd name="connsiteX16" fmla="*/ 4289416 w 4580154"/>
+              <a:gd name="connsiteY16" fmla="*/ 235450 h 3955686"/>
+              <a:gd name="connsiteX17" fmla="*/ 4211038 w 4580154"/>
+              <a:gd name="connsiteY17" fmla="*/ 61279 h 3955686"/>
+              <a:gd name="connsiteX18" fmla="*/ 4036867 w 4580154"/>
+              <a:gd name="connsiteY18" fmla="*/ 235450 h 3955686"/>
+              <a:gd name="connsiteX19" fmla="*/ 3888821 w 4580154"/>
+              <a:gd name="connsiteY19" fmla="*/ 319 h 3955686"/>
+              <a:gd name="connsiteX20" fmla="*/ 3723358 w 4580154"/>
+              <a:gd name="connsiteY20" fmla="*/ 313827 h 3955686"/>
+              <a:gd name="connsiteX0" fmla="*/ 3723358 w 4580154"/>
+              <a:gd name="connsiteY0" fmla="*/ 313827 h 3955686"/>
+              <a:gd name="connsiteX1" fmla="*/ 3113758 w 4580154"/>
+              <a:gd name="connsiteY1" fmla="*/ 1184684 h 3955686"/>
+              <a:gd name="connsiteX2" fmla="*/ 2321278 w 4580154"/>
+              <a:gd name="connsiteY2" fmla="*/ 2003290 h 3955686"/>
+              <a:gd name="connsiteX3" fmla="*/ 1406878 w 4580154"/>
+              <a:gd name="connsiteY3" fmla="*/ 2699976 h 3955686"/>
+              <a:gd name="connsiteX4" fmla="*/ 431518 w 4580154"/>
+              <a:gd name="connsiteY4" fmla="*/ 3109279 h 3955686"/>
+              <a:gd name="connsiteX5" fmla="*/ 327015 w 4580154"/>
+              <a:gd name="connsiteY5" fmla="*/ 3318285 h 3955686"/>
+              <a:gd name="connsiteX6" fmla="*/ 65758 w 4580154"/>
+              <a:gd name="connsiteY6" fmla="*/ 3353119 h 3955686"/>
+              <a:gd name="connsiteX7" fmla="*/ 205096 w 4580154"/>
+              <a:gd name="connsiteY7" fmla="*/ 3666627 h 3955686"/>
+              <a:gd name="connsiteX8" fmla="*/ 4798 w 4580154"/>
+              <a:gd name="connsiteY8" fmla="*/ 3901759 h 3955686"/>
+              <a:gd name="connsiteX9" fmla="*/ 475061 w 4580154"/>
+              <a:gd name="connsiteY9" fmla="*/ 3901759 h 3955686"/>
+              <a:gd name="connsiteX10" fmla="*/ 1790056 w 4580154"/>
+              <a:gd name="connsiteY10" fmla="*/ 3309576 h 3955686"/>
+              <a:gd name="connsiteX11" fmla="*/ 3052798 w 4580154"/>
+              <a:gd name="connsiteY11" fmla="*/ 2438719 h 3955686"/>
+              <a:gd name="connsiteX12" fmla="*/ 3827861 w 4580154"/>
+              <a:gd name="connsiteY12" fmla="*/ 1681073 h 3955686"/>
+              <a:gd name="connsiteX13" fmla="*/ 4341667 w 4580154"/>
+              <a:gd name="connsiteY13" fmla="*/ 949553 h 3955686"/>
+              <a:gd name="connsiteX14" fmla="*/ 4550673 w 4580154"/>
+              <a:gd name="connsiteY14" fmla="*/ 418330 h 3955686"/>
+              <a:gd name="connsiteX15" fmla="*/ 4550673 w 4580154"/>
+              <a:gd name="connsiteY15" fmla="*/ 26444 h 3955686"/>
+              <a:gd name="connsiteX16" fmla="*/ 4289416 w 4580154"/>
+              <a:gd name="connsiteY16" fmla="*/ 235450 h 3955686"/>
+              <a:gd name="connsiteX17" fmla="*/ 4211038 w 4580154"/>
+              <a:gd name="connsiteY17" fmla="*/ 61279 h 3955686"/>
+              <a:gd name="connsiteX18" fmla="*/ 4036867 w 4580154"/>
+              <a:gd name="connsiteY18" fmla="*/ 235450 h 3955686"/>
+              <a:gd name="connsiteX19" fmla="*/ 3888821 w 4580154"/>
+              <a:gd name="connsiteY19" fmla="*/ 319 h 3955686"/>
+              <a:gd name="connsiteX20" fmla="*/ 3723358 w 4580154"/>
+              <a:gd name="connsiteY20" fmla="*/ 313827 h 3955686"/>
+              <a:gd name="connsiteX0" fmla="*/ 3724186 w 4580982"/>
+              <a:gd name="connsiteY0" fmla="*/ 313827 h 3955686"/>
+              <a:gd name="connsiteX1" fmla="*/ 3114586 w 4580982"/>
+              <a:gd name="connsiteY1" fmla="*/ 1184684 h 3955686"/>
+              <a:gd name="connsiteX2" fmla="*/ 2322106 w 4580982"/>
+              <a:gd name="connsiteY2" fmla="*/ 2003290 h 3955686"/>
+              <a:gd name="connsiteX3" fmla="*/ 1407706 w 4580982"/>
+              <a:gd name="connsiteY3" fmla="*/ 2699976 h 3955686"/>
+              <a:gd name="connsiteX4" fmla="*/ 432346 w 4580982"/>
+              <a:gd name="connsiteY4" fmla="*/ 3109279 h 3955686"/>
+              <a:gd name="connsiteX5" fmla="*/ 327843 w 4580982"/>
+              <a:gd name="connsiteY5" fmla="*/ 3318285 h 3955686"/>
+              <a:gd name="connsiteX6" fmla="*/ 40461 w 4580982"/>
+              <a:gd name="connsiteY6" fmla="*/ 3405370 h 3955686"/>
+              <a:gd name="connsiteX7" fmla="*/ 205924 w 4580982"/>
+              <a:gd name="connsiteY7" fmla="*/ 3666627 h 3955686"/>
+              <a:gd name="connsiteX8" fmla="*/ 5626 w 4580982"/>
+              <a:gd name="connsiteY8" fmla="*/ 3901759 h 3955686"/>
+              <a:gd name="connsiteX9" fmla="*/ 475889 w 4580982"/>
+              <a:gd name="connsiteY9" fmla="*/ 3901759 h 3955686"/>
+              <a:gd name="connsiteX10" fmla="*/ 1790884 w 4580982"/>
+              <a:gd name="connsiteY10" fmla="*/ 3309576 h 3955686"/>
+              <a:gd name="connsiteX11" fmla="*/ 3053626 w 4580982"/>
+              <a:gd name="connsiteY11" fmla="*/ 2438719 h 3955686"/>
+              <a:gd name="connsiteX12" fmla="*/ 3828689 w 4580982"/>
+              <a:gd name="connsiteY12" fmla="*/ 1681073 h 3955686"/>
+              <a:gd name="connsiteX13" fmla="*/ 4342495 w 4580982"/>
+              <a:gd name="connsiteY13" fmla="*/ 949553 h 3955686"/>
+              <a:gd name="connsiteX14" fmla="*/ 4551501 w 4580982"/>
+              <a:gd name="connsiteY14" fmla="*/ 418330 h 3955686"/>
+              <a:gd name="connsiteX15" fmla="*/ 4551501 w 4580982"/>
+              <a:gd name="connsiteY15" fmla="*/ 26444 h 3955686"/>
+              <a:gd name="connsiteX16" fmla="*/ 4290244 w 4580982"/>
+              <a:gd name="connsiteY16" fmla="*/ 235450 h 3955686"/>
+              <a:gd name="connsiteX17" fmla="*/ 4211866 w 4580982"/>
+              <a:gd name="connsiteY17" fmla="*/ 61279 h 3955686"/>
+              <a:gd name="connsiteX18" fmla="*/ 4037695 w 4580982"/>
+              <a:gd name="connsiteY18" fmla="*/ 235450 h 3955686"/>
+              <a:gd name="connsiteX19" fmla="*/ 3889649 w 4580982"/>
+              <a:gd name="connsiteY19" fmla="*/ 319 h 3955686"/>
+              <a:gd name="connsiteX20" fmla="*/ 3724186 w 4580982"/>
+              <a:gd name="connsiteY20" fmla="*/ 313827 h 3955686"/>
+              <a:gd name="connsiteX0" fmla="*/ 3724186 w 4580982"/>
+              <a:gd name="connsiteY0" fmla="*/ 313827 h 3955686"/>
+              <a:gd name="connsiteX1" fmla="*/ 3114586 w 4580982"/>
+              <a:gd name="connsiteY1" fmla="*/ 1184684 h 3955686"/>
+              <a:gd name="connsiteX2" fmla="*/ 2322106 w 4580982"/>
+              <a:gd name="connsiteY2" fmla="*/ 2003290 h 3955686"/>
+              <a:gd name="connsiteX3" fmla="*/ 1407706 w 4580982"/>
+              <a:gd name="connsiteY3" fmla="*/ 2699976 h 3955686"/>
+              <a:gd name="connsiteX4" fmla="*/ 362677 w 4580982"/>
+              <a:gd name="connsiteY4" fmla="*/ 3117988 h 3955686"/>
+              <a:gd name="connsiteX5" fmla="*/ 327843 w 4580982"/>
+              <a:gd name="connsiteY5" fmla="*/ 3318285 h 3955686"/>
+              <a:gd name="connsiteX6" fmla="*/ 40461 w 4580982"/>
+              <a:gd name="connsiteY6" fmla="*/ 3405370 h 3955686"/>
+              <a:gd name="connsiteX7" fmla="*/ 205924 w 4580982"/>
+              <a:gd name="connsiteY7" fmla="*/ 3666627 h 3955686"/>
+              <a:gd name="connsiteX8" fmla="*/ 5626 w 4580982"/>
+              <a:gd name="connsiteY8" fmla="*/ 3901759 h 3955686"/>
+              <a:gd name="connsiteX9" fmla="*/ 475889 w 4580982"/>
+              <a:gd name="connsiteY9" fmla="*/ 3901759 h 3955686"/>
+              <a:gd name="connsiteX10" fmla="*/ 1790884 w 4580982"/>
+              <a:gd name="connsiteY10" fmla="*/ 3309576 h 3955686"/>
+              <a:gd name="connsiteX11" fmla="*/ 3053626 w 4580982"/>
+              <a:gd name="connsiteY11" fmla="*/ 2438719 h 3955686"/>
+              <a:gd name="connsiteX12" fmla="*/ 3828689 w 4580982"/>
+              <a:gd name="connsiteY12" fmla="*/ 1681073 h 3955686"/>
+              <a:gd name="connsiteX13" fmla="*/ 4342495 w 4580982"/>
+              <a:gd name="connsiteY13" fmla="*/ 949553 h 3955686"/>
+              <a:gd name="connsiteX14" fmla="*/ 4551501 w 4580982"/>
+              <a:gd name="connsiteY14" fmla="*/ 418330 h 3955686"/>
+              <a:gd name="connsiteX15" fmla="*/ 4551501 w 4580982"/>
+              <a:gd name="connsiteY15" fmla="*/ 26444 h 3955686"/>
+              <a:gd name="connsiteX16" fmla="*/ 4290244 w 4580982"/>
+              <a:gd name="connsiteY16" fmla="*/ 235450 h 3955686"/>
+              <a:gd name="connsiteX17" fmla="*/ 4211866 w 4580982"/>
+              <a:gd name="connsiteY17" fmla="*/ 61279 h 3955686"/>
+              <a:gd name="connsiteX18" fmla="*/ 4037695 w 4580982"/>
+              <a:gd name="connsiteY18" fmla="*/ 235450 h 3955686"/>
+              <a:gd name="connsiteX19" fmla="*/ 3889649 w 4580982"/>
+              <a:gd name="connsiteY19" fmla="*/ 319 h 3955686"/>
+              <a:gd name="connsiteX20" fmla="*/ 3724186 w 4580982"/>
+              <a:gd name="connsiteY20" fmla="*/ 313827 h 3955686"/>
+            </a:gdLst>
+            <a:ahLst/>
+            <a:cxnLst>
+              <a:cxn ang="0">
+                <a:pos x="connsiteX0" y="connsiteY0"/>
+              </a:cxn>
+              <a:cxn ang="0">
+                <a:pos x="connsiteX1" y="connsiteY1"/>
+              </a:cxn>
+              <a:cxn ang="0">
+                <a:pos x="connsiteX2" y="connsiteY2"/>
+              </a:cxn>
+              <a:cxn ang="0">
+                <a:pos x="connsiteX3" y="connsiteY3"/>
+              </a:cxn>
+              <a:cxn ang="0">
+                <a:pos x="connsiteX4" y="connsiteY4"/>
+              </a:cxn>
+              <a:cxn ang="0">
+                <a:pos x="connsiteX5" y="connsiteY5"/>
+              </a:cxn>
+              <a:cxn ang="0">
+                <a:pos x="connsiteX6" y="connsiteY6"/>
+              </a:cxn>
+              <a:cxn ang="0">
+                <a:pos x="connsiteX7" y="connsiteY7"/>
+              </a:cxn>
+              <a:cxn ang="0">
+                <a:pos x="connsiteX8" y="connsiteY8"/>
+              </a:cxn>
+              <a:cxn ang="0">
+                <a:pos x="connsiteX9" y="connsiteY9"/>
+              </a:cxn>
+              <a:cxn ang="0">
+                <a:pos x="connsiteX10" y="connsiteY10"/>
+              </a:cxn>
+              <a:cxn ang="0">
+                <a:pos x="connsiteX11" y="connsiteY11"/>
+              </a:cxn>
+              <a:cxn ang="0">
+                <a:pos x="connsiteX12" y="connsiteY12"/>
+              </a:cxn>
+              <a:cxn ang="0">
+                <a:pos x="connsiteX13" y="connsiteY13"/>
+              </a:cxn>
+              <a:cxn ang="0">
+                <a:pos x="connsiteX14" y="connsiteY14"/>
+              </a:cxn>
+              <a:cxn ang="0">
+                <a:pos x="connsiteX15" y="connsiteY15"/>
+              </a:cxn>
+              <a:cxn ang="0">
+                <a:pos x="connsiteX16" y="connsiteY16"/>
+              </a:cxn>
+              <a:cxn ang="0">
+                <a:pos x="connsiteX17" y="connsiteY17"/>
+              </a:cxn>
+              <a:cxn ang="0">
+                <a:pos x="connsiteX18" y="connsiteY18"/>
+              </a:cxn>
+              <a:cxn ang="0">
+                <a:pos x="connsiteX19" y="connsiteY19"/>
+              </a:cxn>
+              <a:cxn ang="0">
+                <a:pos x="connsiteX20" y="connsiteY20"/>
+              </a:cxn>
+            </a:cxnLst>
+            <a:rect l="l" t="t" r="r" b="b"/>
+            <a:pathLst>
+              <a:path w="4580982" h="3955686">
+                <a:moveTo>
+                  <a:pt x="3724186" y="313827"/>
+                </a:moveTo>
+                <a:cubicBezTo>
+                  <a:pt x="3595009" y="511221"/>
+                  <a:pt x="3348266" y="903107"/>
+                  <a:pt x="3114586" y="1184684"/>
+                </a:cubicBezTo>
+                <a:cubicBezTo>
+                  <a:pt x="2880906" y="1466261"/>
+                  <a:pt x="2606586" y="1750741"/>
+                  <a:pt x="2322106" y="2003290"/>
+                </a:cubicBezTo>
+                <a:cubicBezTo>
+                  <a:pt x="2037626" y="2255839"/>
+                  <a:pt x="1734277" y="2514193"/>
+                  <a:pt x="1407706" y="2699976"/>
+                </a:cubicBezTo>
+                <a:cubicBezTo>
+                  <a:pt x="1081135" y="2885759"/>
+                  <a:pt x="542654" y="3014937"/>
+                  <a:pt x="362677" y="3117988"/>
+                </a:cubicBezTo>
+                <a:cubicBezTo>
+                  <a:pt x="182700" y="3221039"/>
+                  <a:pt x="388803" y="3277645"/>
+                  <a:pt x="327843" y="3318285"/>
+                </a:cubicBezTo>
+                <a:cubicBezTo>
+                  <a:pt x="266883" y="3358925"/>
+                  <a:pt x="60781" y="3347313"/>
+                  <a:pt x="40461" y="3405370"/>
+                </a:cubicBezTo>
+                <a:cubicBezTo>
+                  <a:pt x="20141" y="3463427"/>
+                  <a:pt x="211730" y="3583896"/>
+                  <a:pt x="205924" y="3666627"/>
+                </a:cubicBezTo>
+                <a:cubicBezTo>
+                  <a:pt x="200118" y="3749358"/>
+                  <a:pt x="-39368" y="3862570"/>
+                  <a:pt x="5626" y="3901759"/>
+                </a:cubicBezTo>
+                <a:cubicBezTo>
+                  <a:pt x="50620" y="3940948"/>
+                  <a:pt x="178346" y="4000456"/>
+                  <a:pt x="475889" y="3901759"/>
+                </a:cubicBezTo>
+                <a:cubicBezTo>
+                  <a:pt x="773432" y="3803062"/>
+                  <a:pt x="1361261" y="3553416"/>
+                  <a:pt x="1790884" y="3309576"/>
+                </a:cubicBezTo>
+                <a:cubicBezTo>
+                  <a:pt x="2220507" y="3065736"/>
+                  <a:pt x="2713992" y="2710136"/>
+                  <a:pt x="3053626" y="2438719"/>
+                </a:cubicBezTo>
+                <a:cubicBezTo>
+                  <a:pt x="3393260" y="2167302"/>
+                  <a:pt x="3613877" y="1929267"/>
+                  <a:pt x="3828689" y="1681073"/>
+                </a:cubicBezTo>
+                <a:cubicBezTo>
+                  <a:pt x="4043501" y="1432879"/>
+                  <a:pt x="4222026" y="1160010"/>
+                  <a:pt x="4342495" y="949553"/>
+                </a:cubicBezTo>
+                <a:cubicBezTo>
+                  <a:pt x="4462964" y="739096"/>
+                  <a:pt x="4516667" y="572182"/>
+                  <a:pt x="4551501" y="418330"/>
+                </a:cubicBezTo>
+                <a:cubicBezTo>
+                  <a:pt x="4586335" y="264478"/>
+                  <a:pt x="4595044" y="56924"/>
+                  <a:pt x="4551501" y="26444"/>
+                </a:cubicBezTo>
+                <a:cubicBezTo>
+                  <a:pt x="4507958" y="-4036"/>
+                  <a:pt x="4346850" y="229644"/>
+                  <a:pt x="4290244" y="235450"/>
+                </a:cubicBezTo>
+                <a:cubicBezTo>
+                  <a:pt x="4233638" y="241256"/>
+                  <a:pt x="4253957" y="61279"/>
+                  <a:pt x="4211866" y="61279"/>
+                </a:cubicBezTo>
+                <a:cubicBezTo>
+                  <a:pt x="4169775" y="61279"/>
+                  <a:pt x="4091398" y="245610"/>
+                  <a:pt x="4037695" y="235450"/>
+                </a:cubicBezTo>
+                <a:cubicBezTo>
+                  <a:pt x="3983992" y="225290"/>
+                  <a:pt x="3941901" y="-9841"/>
+                  <a:pt x="3889649" y="319"/>
+                </a:cubicBezTo>
+                <a:cubicBezTo>
+                  <a:pt x="3837398" y="10479"/>
+                  <a:pt x="3853363" y="116433"/>
+                  <a:pt x="3724186" y="313827"/>
+                </a:cubicBezTo>
+                <a:close/>
+              </a:path>
+            </a:pathLst>
+          </a:custGeom>
+        </p:spPr>
+        <p:style>
+          <a:lnRef idx="2">
+            <a:schemeClr val="accent1">
+              <a:shade val="50000"/>
+            </a:schemeClr>
+          </a:lnRef>
+          <a:fillRef idx="1">
+            <a:schemeClr val="accent1"/>
+          </a:fillRef>
+          <a:effectRef idx="0">
+            <a:schemeClr val="accent1"/>
+          </a:effectRef>
+          <a:fontRef idx="minor">
+            <a:schemeClr val="lt1"/>
+          </a:fontRef>
+        </p:style>
+        <p:txBody>
+          <a:bodyPr rtlCol="0" anchor="ctr"/>
+          <a:lstStyle/>
+          <a:p>
+            <a:pPr algn="ctr"/>
+            <a:endParaRPr lang="en-US"/>
+          </a:p>
+        </p:txBody>
+      </p:sp>
+      <p:sp>
+        <p:nvSpPr>
+          <p:cNvPr id="2" name="Title 1">
+            <a:extLst>
+              <a:ext uri="{FF2B5EF4-FFF2-40B4-BE49-F238E27FC236}">
+                <a16:creationId xmlns:a16="http://schemas.microsoft.com/office/drawing/2014/main" id="{73543DA1-ED36-504D-93A6-E6F1B6A7CE8D}"/>
+              </a:ext>
+            </a:extLst>
+          </p:cNvPr>
+          <p:cNvSpPr>
+            <a:spLocks noGrp="1"/>
+          </p:cNvSpPr>
+          <p:nvPr>
+            <p:ph type="title"/>
+          </p:nvPr>
+        </p:nvSpPr>
+        <p:spPr>
+          <a:xfrm>
+            <a:off x="204154" y="187684"/>
+            <a:ext cx="10515600" cy="703510"/>
+          </a:xfrm>
+        </p:spPr>
+        <p:txBody>
+          <a:bodyPr>
+            <a:normAutofit/>
+          </a:bodyPr>
+          <a:lstStyle/>
+          <a:p>
+            <a:r>
+              <a:rPr lang="en-US" sz="3600" dirty="0"/>
+              <a:t>Edge of Chaos</a:t>
+            </a:r>
+          </a:p>
+        </p:txBody>
+      </p:sp>
+      <p:sp>
+        <p:nvSpPr>
+          <p:cNvPr id="3" name="Content Placeholder 2">
+            <a:extLst>
+              <a:ext uri="{FF2B5EF4-FFF2-40B4-BE49-F238E27FC236}">
+                <a16:creationId xmlns:a16="http://schemas.microsoft.com/office/drawing/2014/main" id="{B83F246F-F1F3-BE4C-9E8C-381F613C763C}"/>
+              </a:ext>
+            </a:extLst>
+          </p:cNvPr>
+          <p:cNvSpPr>
+            <a:spLocks noGrp="1"/>
+          </p:cNvSpPr>
+          <p:nvPr>
+            <p:ph idx="1"/>
+          </p:nvPr>
+        </p:nvSpPr>
+        <p:spPr>
+          <a:xfrm>
+            <a:off x="595829" y="5923498"/>
+            <a:ext cx="10515600" cy="569377"/>
+          </a:xfrm>
+        </p:spPr>
+        <p:txBody>
+          <a:bodyPr/>
+          <a:lstStyle/>
+          <a:p>
+            <a:r>
+              <a:rPr lang="en-US"/>
+              <a:t>In the graph</a:t>
+            </a:r>
+            <a:endParaRPr lang="en-US" dirty="0"/>
+          </a:p>
+        </p:txBody>
+      </p:sp>
+      <p:sp>
+        <p:nvSpPr>
+          <p:cNvPr id="8" name="Oval 7">
+            <a:extLst>
+              <a:ext uri="{FF2B5EF4-FFF2-40B4-BE49-F238E27FC236}">
+                <a16:creationId xmlns:a16="http://schemas.microsoft.com/office/drawing/2014/main" id="{E30F47BF-CC32-E942-9F9F-2426F6912DDB}"/>
+              </a:ext>
+            </a:extLst>
+          </p:cNvPr>
+          <p:cNvSpPr/>
+          <p:nvPr/>
+        </p:nvSpPr>
+        <p:spPr>
+          <a:xfrm>
+            <a:off x="3410568" y="4687486"/>
+            <a:ext cx="895514" cy="636951"/>
+          </a:xfrm>
+          <a:prstGeom prst="ellipse">
+            <a:avLst/>
+          </a:prstGeom>
+          <a:solidFill>
+            <a:schemeClr val="bg1">
+              <a:lumMod val="85000"/>
+            </a:schemeClr>
+          </a:solidFill>
+        </p:spPr>
+        <p:style>
+          <a:lnRef idx="2">
+            <a:schemeClr val="accent1">
+              <a:shade val="50000"/>
+            </a:schemeClr>
+          </a:lnRef>
+          <a:fillRef idx="1">
+            <a:schemeClr val="accent1"/>
+          </a:fillRef>
+          <a:effectRef idx="0">
+            <a:schemeClr val="accent1"/>
+          </a:effectRef>
+          <a:fontRef idx="minor">
+            <a:schemeClr val="lt1"/>
+          </a:fontRef>
+        </p:style>
+        <p:txBody>
+          <a:bodyPr rtlCol="0" anchor="ctr"/>
+          <a:lstStyle/>
+          <a:p>
+            <a:pPr algn="ctr"/>
+            <a:r>
+              <a:rPr lang="en-US" sz="3200">
+                <a:solidFill>
+                  <a:schemeClr val="tx1"/>
+                </a:solidFill>
+              </a:rPr>
+              <a:t>?</a:t>
+            </a:r>
+            <a:endParaRPr lang="en-US" sz="3200" dirty="0">
+              <a:solidFill>
+                <a:schemeClr val="tx1"/>
+              </a:solidFill>
+            </a:endParaRPr>
+          </a:p>
+        </p:txBody>
+      </p:sp>
+      <p:sp>
+        <p:nvSpPr>
+          <p:cNvPr id="9" name="Oval 8">
+            <a:extLst>
+              <a:ext uri="{FF2B5EF4-FFF2-40B4-BE49-F238E27FC236}">
+                <a16:creationId xmlns:a16="http://schemas.microsoft.com/office/drawing/2014/main" id="{5562FDFA-BC3A-E347-AFB6-F3F02E6F879C}"/>
+              </a:ext>
+            </a:extLst>
+          </p:cNvPr>
+          <p:cNvSpPr/>
+          <p:nvPr/>
+        </p:nvSpPr>
+        <p:spPr>
+          <a:xfrm>
+            <a:off x="6096000" y="2364849"/>
+            <a:ext cx="895514" cy="636951"/>
+          </a:xfrm>
+          <a:prstGeom prst="ellipse">
+            <a:avLst/>
+          </a:prstGeom>
+          <a:solidFill>
+            <a:schemeClr val="bg1">
+              <a:lumMod val="85000"/>
+            </a:schemeClr>
+          </a:solidFill>
+        </p:spPr>
+        <p:style>
+          <a:lnRef idx="2">
+            <a:schemeClr val="accent1">
+              <a:shade val="50000"/>
+            </a:schemeClr>
+          </a:lnRef>
+          <a:fillRef idx="1">
+            <a:schemeClr val="accent1"/>
+          </a:fillRef>
+          <a:effectRef idx="0">
+            <a:schemeClr val="accent1"/>
+          </a:effectRef>
+          <a:fontRef idx="minor">
+            <a:schemeClr val="lt1"/>
+          </a:fontRef>
+        </p:style>
+        <p:txBody>
+          <a:bodyPr rtlCol="0" anchor="ctr"/>
+          <a:lstStyle/>
+          <a:p>
+            <a:pPr algn="ctr"/>
+            <a:r>
+              <a:rPr lang="en-US" sz="3200">
+                <a:solidFill>
+                  <a:schemeClr val="tx1"/>
+                </a:solidFill>
+              </a:rPr>
+              <a:t>?</a:t>
+            </a:r>
+            <a:endParaRPr lang="en-US" sz="3200" dirty="0">
+              <a:solidFill>
+                <a:schemeClr val="tx1"/>
+              </a:solidFill>
+            </a:endParaRPr>
+          </a:p>
+        </p:txBody>
+      </p:sp>
+      <p:sp>
+        <p:nvSpPr>
+          <p:cNvPr id="10" name="Oval 9">
+            <a:extLst>
+              <a:ext uri="{FF2B5EF4-FFF2-40B4-BE49-F238E27FC236}">
+                <a16:creationId xmlns:a16="http://schemas.microsoft.com/office/drawing/2014/main" id="{9CC6DB88-AFA3-4146-80DE-0B6999FF86E0}"/>
+              </a:ext>
+            </a:extLst>
+          </p:cNvPr>
+          <p:cNvSpPr/>
+          <p:nvPr/>
+        </p:nvSpPr>
+        <p:spPr>
+          <a:xfrm>
+            <a:off x="5573731" y="3014283"/>
+            <a:ext cx="895514" cy="636951"/>
+          </a:xfrm>
+          <a:prstGeom prst="ellipse">
+            <a:avLst/>
+          </a:prstGeom>
+          <a:solidFill>
+            <a:schemeClr val="bg1">
+              <a:lumMod val="85000"/>
+            </a:schemeClr>
+          </a:solidFill>
+        </p:spPr>
+        <p:style>
+          <a:lnRef idx="2">
+            <a:schemeClr val="accent1">
+              <a:shade val="50000"/>
+            </a:schemeClr>
+          </a:lnRef>
+          <a:fillRef idx="1">
+            <a:schemeClr val="accent1"/>
+          </a:fillRef>
+          <a:effectRef idx="0">
+            <a:schemeClr val="accent1"/>
+          </a:effectRef>
+          <a:fontRef idx="minor">
+            <a:schemeClr val="lt1"/>
+          </a:fontRef>
+        </p:style>
+        <p:txBody>
+          <a:bodyPr rtlCol="0" anchor="ctr"/>
+          <a:lstStyle/>
+          <a:p>
+            <a:pPr algn="ctr"/>
+            <a:r>
+              <a:rPr lang="en-US" sz="3200">
+                <a:solidFill>
+                  <a:schemeClr val="tx1"/>
+                </a:solidFill>
+              </a:rPr>
+              <a:t>?</a:t>
+            </a:r>
+            <a:endParaRPr lang="en-US" sz="3200" dirty="0">
+              <a:solidFill>
+                <a:schemeClr val="tx1"/>
+              </a:solidFill>
+            </a:endParaRPr>
+          </a:p>
+        </p:txBody>
+      </p:sp>
+      <p:sp>
+        <p:nvSpPr>
+          <p:cNvPr id="11" name="Oval 10">
+            <a:extLst>
+              <a:ext uri="{FF2B5EF4-FFF2-40B4-BE49-F238E27FC236}">
+                <a16:creationId xmlns:a16="http://schemas.microsoft.com/office/drawing/2014/main" id="{1A8FA844-9DF5-C847-8F97-2F5C3AF2CB8C}"/>
+              </a:ext>
+            </a:extLst>
+          </p:cNvPr>
+          <p:cNvSpPr/>
+          <p:nvPr/>
+        </p:nvSpPr>
+        <p:spPr>
+          <a:xfrm>
+            <a:off x="4902162" y="3663717"/>
+            <a:ext cx="895514" cy="636951"/>
+          </a:xfrm>
+          <a:prstGeom prst="ellipse">
+            <a:avLst/>
+          </a:prstGeom>
+          <a:solidFill>
+            <a:schemeClr val="bg1">
+              <a:lumMod val="85000"/>
+            </a:schemeClr>
+          </a:solidFill>
+        </p:spPr>
+        <p:style>
+          <a:lnRef idx="2">
+            <a:schemeClr val="accent1">
+              <a:shade val="50000"/>
+            </a:schemeClr>
+          </a:lnRef>
+          <a:fillRef idx="1">
+            <a:schemeClr val="accent1"/>
+          </a:fillRef>
+          <a:effectRef idx="0">
+            <a:schemeClr val="accent1"/>
+          </a:effectRef>
+          <a:fontRef idx="minor">
+            <a:schemeClr val="lt1"/>
+          </a:fontRef>
+        </p:style>
+        <p:txBody>
+          <a:bodyPr rtlCol="0" anchor="ctr"/>
+          <a:lstStyle/>
+          <a:p>
+            <a:pPr algn="ctr"/>
+            <a:r>
+              <a:rPr lang="en-US" sz="3200">
+                <a:solidFill>
+                  <a:schemeClr val="tx1"/>
+                </a:solidFill>
+              </a:rPr>
+              <a:t>?</a:t>
+            </a:r>
+            <a:endParaRPr lang="en-US" sz="3200" dirty="0">
+              <a:solidFill>
+                <a:schemeClr val="tx1"/>
+              </a:solidFill>
+            </a:endParaRPr>
+          </a:p>
+        </p:txBody>
+      </p:sp>
+      <p:sp>
+        <p:nvSpPr>
+          <p:cNvPr id="12" name="Oval 11">
+            <a:extLst>
+              <a:ext uri="{FF2B5EF4-FFF2-40B4-BE49-F238E27FC236}">
+                <a16:creationId xmlns:a16="http://schemas.microsoft.com/office/drawing/2014/main" id="{D7F36A3E-E7B9-3D47-AB95-D815E492E8B1}"/>
+              </a:ext>
+            </a:extLst>
+          </p:cNvPr>
+          <p:cNvSpPr/>
+          <p:nvPr/>
+        </p:nvSpPr>
+        <p:spPr>
+          <a:xfrm>
+            <a:off x="4227635" y="4225587"/>
+            <a:ext cx="895514" cy="636951"/>
+          </a:xfrm>
+          <a:prstGeom prst="ellipse">
+            <a:avLst/>
+          </a:prstGeom>
+          <a:solidFill>
+            <a:schemeClr val="bg1">
+              <a:lumMod val="85000"/>
+            </a:schemeClr>
+          </a:solidFill>
+        </p:spPr>
+        <p:style>
+          <a:lnRef idx="2">
+            <a:schemeClr val="accent1">
+              <a:shade val="50000"/>
+            </a:schemeClr>
+          </a:lnRef>
+          <a:fillRef idx="1">
+            <a:schemeClr val="accent1"/>
+          </a:fillRef>
+          <a:effectRef idx="0">
+            <a:schemeClr val="accent1"/>
+          </a:effectRef>
+          <a:fontRef idx="minor">
+            <a:schemeClr val="lt1"/>
+          </a:fontRef>
+        </p:style>
+        <p:txBody>
+          <a:bodyPr rtlCol="0" anchor="ctr"/>
+          <a:lstStyle/>
+          <a:p>
+            <a:pPr algn="ctr"/>
+            <a:r>
+              <a:rPr lang="en-US" sz="3200">
+                <a:solidFill>
+                  <a:schemeClr val="tx1"/>
+                </a:solidFill>
+              </a:rPr>
+              <a:t>?</a:t>
+            </a:r>
+            <a:endParaRPr lang="en-US" sz="3200" dirty="0">
+              <a:solidFill>
+                <a:schemeClr val="tx1"/>
+              </a:solidFill>
+            </a:endParaRPr>
+          </a:p>
+        </p:txBody>
+      </p:sp>
+      <p:sp>
+        <p:nvSpPr>
+          <p:cNvPr id="14" name="Rectangle 13">
+            <a:extLst>
+              <a:ext uri="{FF2B5EF4-FFF2-40B4-BE49-F238E27FC236}">
+                <a16:creationId xmlns:a16="http://schemas.microsoft.com/office/drawing/2014/main" id="{97B83DF2-2A4F-6E4A-AE92-A7573AAE8DDB}"/>
+              </a:ext>
+            </a:extLst>
+          </p:cNvPr>
+          <p:cNvSpPr/>
+          <p:nvPr/>
+        </p:nvSpPr>
+        <p:spPr>
+          <a:xfrm rot="19175529">
+            <a:off x="1721347" y="2547027"/>
+            <a:ext cx="4847929" cy="1284175"/>
+          </a:xfrm>
+          <a:prstGeom prst="rect">
+            <a:avLst/>
+          </a:prstGeom>
+          <a:noFill/>
+        </p:spPr>
+        <p:txBody>
+          <a:bodyPr wrap="none" lIns="91440" tIns="45720" rIns="91440" bIns="45720">
+            <a:prstTxWarp prst="textArchDown">
+              <a:avLst/>
+            </a:prstTxWarp>
+            <a:spAutoFit/>
+          </a:bodyPr>
+          <a:lstStyle/>
+          <a:p>
+            <a:pPr algn="ctr"/>
+            <a:r>
+              <a:rPr lang="en-US" sz="5400" b="1" dirty="0">
+                <a:ln w="12700" cmpd="sng">
+                  <a:solidFill>
+                    <a:schemeClr val="accent4"/>
+                  </a:solidFill>
+                  <a:prstDash val="solid"/>
+                </a:ln>
+                <a:gradFill>
+                  <a:gsLst>
+                    <a:gs pos="0">
+                      <a:schemeClr val="accent4"/>
+                    </a:gs>
+                    <a:gs pos="4000">
+                      <a:schemeClr val="accent4">
+                        <a:lumMod val="60000"/>
+                        <a:lumOff val="40000"/>
+                      </a:schemeClr>
+                    </a:gs>
+                    <a:gs pos="87000">
+                      <a:schemeClr val="accent4">
+                        <a:lumMod val="20000"/>
+                        <a:lumOff val="80000"/>
+                      </a:schemeClr>
+                    </a:gs>
+                  </a:gsLst>
+                  <a:lin ang="5400000"/>
+                </a:gradFill>
+              </a:rPr>
+              <a:t>EDGE OF CHAOS</a:t>
+            </a:r>
+          </a:p>
+        </p:txBody>
+      </p:sp>
+      <p:sp>
+        <p:nvSpPr>
+          <p:cNvPr id="21" name="TextBox 20">
+            <a:extLst>
+              <a:ext uri="{FF2B5EF4-FFF2-40B4-BE49-F238E27FC236}">
+                <a16:creationId xmlns:a16="http://schemas.microsoft.com/office/drawing/2014/main" id="{CD953259-1852-894A-A863-C5024C1C2541}"/>
+              </a:ext>
+            </a:extLst>
+          </p:cNvPr>
+          <p:cNvSpPr txBox="1"/>
+          <p:nvPr/>
+        </p:nvSpPr>
+        <p:spPr>
+          <a:xfrm rot="19042359">
+            <a:off x="4832987" y="4199454"/>
+            <a:ext cx="2208232" cy="369332"/>
+          </a:xfrm>
+          <a:prstGeom prst="rect">
+            <a:avLst/>
+          </a:prstGeom>
+          <a:noFill/>
+        </p:spPr>
+        <p:txBody>
+          <a:bodyPr wrap="none" rtlCol="0">
+            <a:spAutoFit/>
+          </a:bodyPr>
+          <a:lstStyle/>
+          <a:p>
+            <a:pPr algn="ctr"/>
+            <a:r>
+              <a:rPr lang="en-US" dirty="0"/>
+              <a:t>Unmodeled Concepts</a:t>
+            </a:r>
+          </a:p>
+        </p:txBody>
+      </p:sp>
+      <p:sp>
+        <p:nvSpPr>
+          <p:cNvPr id="17" name="Oval 16">
+            <a:extLst>
+              <a:ext uri="{FF2B5EF4-FFF2-40B4-BE49-F238E27FC236}">
+                <a16:creationId xmlns:a16="http://schemas.microsoft.com/office/drawing/2014/main" id="{15BC5790-D5E5-D244-BDF4-985C481696DE}"/>
+              </a:ext>
+            </a:extLst>
+          </p:cNvPr>
+          <p:cNvSpPr/>
+          <p:nvPr/>
+        </p:nvSpPr>
+        <p:spPr>
+          <a:xfrm>
+            <a:off x="2607724" y="1381541"/>
+            <a:ext cx="250295" cy="209498"/>
+          </a:xfrm>
+          <a:prstGeom prst="ellipse">
+            <a:avLst/>
+          </a:prstGeom>
+          <a:solidFill>
+            <a:schemeClr val="tx1">
+              <a:lumMod val="50000"/>
+              <a:lumOff val="50000"/>
+            </a:schemeClr>
+          </a:solidFill>
+          <a:ln>
+            <a:solidFill>
+              <a:schemeClr val="tx1"/>
+            </a:solidFill>
+          </a:ln>
+        </p:spPr>
+        <p:style>
+          <a:lnRef idx="2">
+            <a:schemeClr val="accent1">
+              <a:shade val="50000"/>
+            </a:schemeClr>
+          </a:lnRef>
+          <a:fillRef idx="1">
+            <a:schemeClr val="accent1"/>
+          </a:fillRef>
+          <a:effectRef idx="0">
+            <a:schemeClr val="accent1"/>
+          </a:effectRef>
+          <a:fontRef idx="minor">
+            <a:schemeClr val="lt1"/>
+          </a:fontRef>
+        </p:style>
+        <p:txBody>
+          <a:bodyPr rtlCol="0" anchor="ctr"/>
+          <a:lstStyle/>
+          <a:p>
+            <a:pPr algn="ctr"/>
+            <a:endParaRPr lang="en-US"/>
+          </a:p>
+        </p:txBody>
+      </p:sp>
+      <p:sp>
+        <p:nvSpPr>
+          <p:cNvPr id="23" name="Oval 22">
+            <a:extLst>
+              <a:ext uri="{FF2B5EF4-FFF2-40B4-BE49-F238E27FC236}">
+                <a16:creationId xmlns:a16="http://schemas.microsoft.com/office/drawing/2014/main" id="{9915ED66-B841-CF45-90A2-0D9CD773110F}"/>
+              </a:ext>
+            </a:extLst>
+          </p:cNvPr>
+          <p:cNvSpPr/>
+          <p:nvPr/>
+        </p:nvSpPr>
+        <p:spPr>
+          <a:xfrm>
+            <a:off x="3282285" y="1523272"/>
+            <a:ext cx="250295" cy="209498"/>
+          </a:xfrm>
+          <a:prstGeom prst="ellipse">
+            <a:avLst/>
+          </a:prstGeom>
+          <a:solidFill>
+            <a:schemeClr val="tx1">
+              <a:lumMod val="50000"/>
+              <a:lumOff val="50000"/>
+            </a:schemeClr>
+          </a:solidFill>
+          <a:ln>
+            <a:solidFill>
+              <a:schemeClr val="tx1"/>
+            </a:solidFill>
+          </a:ln>
+        </p:spPr>
+        <p:style>
+          <a:lnRef idx="2">
+            <a:schemeClr val="accent1">
+              <a:shade val="50000"/>
+            </a:schemeClr>
+          </a:lnRef>
+          <a:fillRef idx="1">
+            <a:schemeClr val="accent1"/>
+          </a:fillRef>
+          <a:effectRef idx="0">
+            <a:schemeClr val="accent1"/>
+          </a:effectRef>
+          <a:fontRef idx="minor">
+            <a:schemeClr val="lt1"/>
+          </a:fontRef>
+        </p:style>
+        <p:txBody>
+          <a:bodyPr rtlCol="0" anchor="ctr"/>
+          <a:lstStyle/>
+          <a:p>
+            <a:pPr algn="ctr"/>
+            <a:endParaRPr lang="en-US"/>
+          </a:p>
+        </p:txBody>
+      </p:sp>
+      <p:sp>
+        <p:nvSpPr>
+          <p:cNvPr id="25" name="Oval 24">
+            <a:extLst>
+              <a:ext uri="{FF2B5EF4-FFF2-40B4-BE49-F238E27FC236}">
+                <a16:creationId xmlns:a16="http://schemas.microsoft.com/office/drawing/2014/main" id="{E8FDD504-9FE9-404A-8E1E-0A2358D1CD79}"/>
+              </a:ext>
+            </a:extLst>
+          </p:cNvPr>
+          <p:cNvSpPr/>
+          <p:nvPr/>
+        </p:nvSpPr>
+        <p:spPr>
+          <a:xfrm>
+            <a:off x="1861178" y="1561230"/>
+            <a:ext cx="250295" cy="209498"/>
+          </a:xfrm>
+          <a:prstGeom prst="ellipse">
+            <a:avLst/>
+          </a:prstGeom>
+          <a:solidFill>
+            <a:schemeClr val="tx1">
+              <a:lumMod val="50000"/>
+              <a:lumOff val="50000"/>
+            </a:schemeClr>
+          </a:solidFill>
+          <a:ln>
+            <a:solidFill>
+              <a:schemeClr val="tx1"/>
+            </a:solidFill>
+          </a:ln>
+        </p:spPr>
+        <p:style>
+          <a:lnRef idx="2">
+            <a:schemeClr val="accent1">
+              <a:shade val="50000"/>
+            </a:schemeClr>
+          </a:lnRef>
+          <a:fillRef idx="1">
+            <a:schemeClr val="accent1"/>
+          </a:fillRef>
+          <a:effectRef idx="0">
+            <a:schemeClr val="accent1"/>
+          </a:effectRef>
+          <a:fontRef idx="minor">
+            <a:schemeClr val="lt1"/>
+          </a:fontRef>
+        </p:style>
+        <p:txBody>
+          <a:bodyPr rtlCol="0" anchor="ctr"/>
+          <a:lstStyle/>
+          <a:p>
+            <a:pPr algn="ctr"/>
+            <a:endParaRPr lang="en-US"/>
+          </a:p>
+        </p:txBody>
+      </p:sp>
+      <p:sp>
+        <p:nvSpPr>
+          <p:cNvPr id="26" name="Oval 25">
+            <a:extLst>
+              <a:ext uri="{FF2B5EF4-FFF2-40B4-BE49-F238E27FC236}">
+                <a16:creationId xmlns:a16="http://schemas.microsoft.com/office/drawing/2014/main" id="{63830599-4E7F-0643-9964-C21FA17B0C2B}"/>
+              </a:ext>
+            </a:extLst>
+          </p:cNvPr>
+          <p:cNvSpPr/>
+          <p:nvPr/>
+        </p:nvSpPr>
+        <p:spPr>
+          <a:xfrm>
+            <a:off x="1317133" y="1725488"/>
+            <a:ext cx="250295" cy="209498"/>
+          </a:xfrm>
+          <a:prstGeom prst="ellipse">
+            <a:avLst/>
+          </a:prstGeom>
+          <a:solidFill>
+            <a:schemeClr val="tx1">
+              <a:lumMod val="50000"/>
+              <a:lumOff val="50000"/>
+            </a:schemeClr>
+          </a:solidFill>
+          <a:ln>
+            <a:solidFill>
+              <a:schemeClr val="tx1"/>
+            </a:solidFill>
+          </a:ln>
+        </p:spPr>
+        <p:style>
+          <a:lnRef idx="2">
+            <a:schemeClr val="accent1">
+              <a:shade val="50000"/>
+            </a:schemeClr>
+          </a:lnRef>
+          <a:fillRef idx="1">
+            <a:schemeClr val="accent1"/>
+          </a:fillRef>
+          <a:effectRef idx="0">
+            <a:schemeClr val="accent1"/>
+          </a:effectRef>
+          <a:fontRef idx="minor">
+            <a:schemeClr val="lt1"/>
+          </a:fontRef>
+        </p:style>
+        <p:txBody>
+          <a:bodyPr rtlCol="0" anchor="ctr"/>
+          <a:lstStyle/>
+          <a:p>
+            <a:pPr algn="ctr"/>
+            <a:endParaRPr lang="en-US"/>
+          </a:p>
+        </p:txBody>
+      </p:sp>
+      <p:sp>
+        <p:nvSpPr>
+          <p:cNvPr id="27" name="Oval 26">
+            <a:extLst>
+              <a:ext uri="{FF2B5EF4-FFF2-40B4-BE49-F238E27FC236}">
+                <a16:creationId xmlns:a16="http://schemas.microsoft.com/office/drawing/2014/main" id="{12865DF2-9554-FE49-88E2-B2DC051F4708}"/>
+              </a:ext>
+            </a:extLst>
+          </p:cNvPr>
+          <p:cNvSpPr/>
+          <p:nvPr/>
+        </p:nvSpPr>
+        <p:spPr>
+          <a:xfrm>
+            <a:off x="1170806" y="2938695"/>
+            <a:ext cx="250295" cy="209498"/>
+          </a:xfrm>
+          <a:prstGeom prst="ellipse">
+            <a:avLst/>
+          </a:prstGeom>
+          <a:solidFill>
+            <a:schemeClr val="tx1">
+              <a:lumMod val="50000"/>
+              <a:lumOff val="50000"/>
+            </a:schemeClr>
+          </a:solidFill>
+          <a:ln>
+            <a:solidFill>
+              <a:schemeClr val="tx1"/>
+            </a:solidFill>
+          </a:ln>
+        </p:spPr>
+        <p:style>
+          <a:lnRef idx="2">
+            <a:schemeClr val="accent1">
+              <a:shade val="50000"/>
+            </a:schemeClr>
+          </a:lnRef>
+          <a:fillRef idx="1">
+            <a:schemeClr val="accent1"/>
+          </a:fillRef>
+          <a:effectRef idx="0">
+            <a:schemeClr val="accent1"/>
+          </a:effectRef>
+          <a:fontRef idx="minor">
+            <a:schemeClr val="lt1"/>
+          </a:fontRef>
+        </p:style>
+        <p:txBody>
+          <a:bodyPr rtlCol="0" anchor="ctr"/>
+          <a:lstStyle/>
+          <a:p>
+            <a:pPr algn="ctr"/>
+            <a:endParaRPr lang="en-US"/>
+          </a:p>
+        </p:txBody>
+      </p:sp>
+      <p:sp>
+        <p:nvSpPr>
+          <p:cNvPr id="28" name="Oval 27">
+            <a:extLst>
+              <a:ext uri="{FF2B5EF4-FFF2-40B4-BE49-F238E27FC236}">
+                <a16:creationId xmlns:a16="http://schemas.microsoft.com/office/drawing/2014/main" id="{29001AA3-1160-4A4E-A086-6AC4AA4C0986}"/>
+              </a:ext>
+            </a:extLst>
+          </p:cNvPr>
+          <p:cNvSpPr/>
+          <p:nvPr/>
+        </p:nvSpPr>
+        <p:spPr>
+          <a:xfrm>
+            <a:off x="1647524" y="2789841"/>
+            <a:ext cx="250295" cy="209498"/>
+          </a:xfrm>
+          <a:prstGeom prst="ellipse">
+            <a:avLst/>
+          </a:prstGeom>
+          <a:solidFill>
+            <a:schemeClr val="tx1">
+              <a:lumMod val="50000"/>
+              <a:lumOff val="50000"/>
+            </a:schemeClr>
+          </a:solidFill>
+          <a:ln>
+            <a:solidFill>
+              <a:schemeClr val="tx1"/>
+            </a:solidFill>
+          </a:ln>
+        </p:spPr>
+        <p:style>
+          <a:lnRef idx="2">
+            <a:schemeClr val="accent1">
+              <a:shade val="50000"/>
+            </a:schemeClr>
+          </a:lnRef>
+          <a:fillRef idx="1">
+            <a:schemeClr val="accent1"/>
+          </a:fillRef>
+          <a:effectRef idx="0">
+            <a:schemeClr val="accent1"/>
+          </a:effectRef>
+          <a:fontRef idx="minor">
+            <a:schemeClr val="lt1"/>
+          </a:fontRef>
+        </p:style>
+        <p:txBody>
+          <a:bodyPr rtlCol="0" anchor="ctr"/>
+          <a:lstStyle/>
+          <a:p>
+            <a:pPr algn="ctr"/>
+            <a:endParaRPr lang="en-US"/>
+          </a:p>
+        </p:txBody>
+      </p:sp>
+      <p:sp>
+        <p:nvSpPr>
+          <p:cNvPr id="29" name="Oval 28">
+            <a:extLst>
+              <a:ext uri="{FF2B5EF4-FFF2-40B4-BE49-F238E27FC236}">
+                <a16:creationId xmlns:a16="http://schemas.microsoft.com/office/drawing/2014/main" id="{435F1415-006C-0B4E-A078-64C5F76A75DB}"/>
+              </a:ext>
+            </a:extLst>
+          </p:cNvPr>
+          <p:cNvSpPr/>
+          <p:nvPr/>
+        </p:nvSpPr>
+        <p:spPr>
+          <a:xfrm>
+            <a:off x="1581034" y="3225983"/>
+            <a:ext cx="250295" cy="209498"/>
+          </a:xfrm>
+          <a:prstGeom prst="ellipse">
+            <a:avLst/>
+          </a:prstGeom>
+          <a:solidFill>
+            <a:schemeClr val="tx1">
+              <a:lumMod val="50000"/>
+              <a:lumOff val="50000"/>
+            </a:schemeClr>
+          </a:solidFill>
+          <a:ln>
+            <a:solidFill>
+              <a:schemeClr val="tx1"/>
+            </a:solidFill>
+          </a:ln>
+        </p:spPr>
+        <p:style>
+          <a:lnRef idx="2">
+            <a:schemeClr val="accent1">
+              <a:shade val="50000"/>
+            </a:schemeClr>
+          </a:lnRef>
+          <a:fillRef idx="1">
+            <a:schemeClr val="accent1"/>
+          </a:fillRef>
+          <a:effectRef idx="0">
+            <a:schemeClr val="accent1"/>
+          </a:effectRef>
+          <a:fontRef idx="minor">
+            <a:schemeClr val="lt1"/>
+          </a:fontRef>
+        </p:style>
+        <p:txBody>
+          <a:bodyPr rtlCol="0" anchor="ctr"/>
+          <a:lstStyle/>
+          <a:p>
+            <a:pPr algn="ctr"/>
+            <a:endParaRPr lang="en-US"/>
+          </a:p>
+        </p:txBody>
+      </p:sp>
+      <p:sp>
+        <p:nvSpPr>
+          <p:cNvPr id="30" name="Oval 29">
+            <a:extLst>
+              <a:ext uri="{FF2B5EF4-FFF2-40B4-BE49-F238E27FC236}">
+                <a16:creationId xmlns:a16="http://schemas.microsoft.com/office/drawing/2014/main" id="{02AD59D0-9A7C-1A46-9761-2FDD6BC5EEEC}"/>
+              </a:ext>
+            </a:extLst>
+          </p:cNvPr>
+          <p:cNvSpPr/>
+          <p:nvPr/>
+        </p:nvSpPr>
+        <p:spPr>
+          <a:xfrm>
+            <a:off x="2064464" y="2969038"/>
+            <a:ext cx="250295" cy="209498"/>
+          </a:xfrm>
+          <a:prstGeom prst="ellipse">
+            <a:avLst/>
+          </a:prstGeom>
+          <a:solidFill>
+            <a:schemeClr val="tx1">
+              <a:lumMod val="50000"/>
+              <a:lumOff val="50000"/>
+            </a:schemeClr>
+          </a:solidFill>
+          <a:ln>
+            <a:solidFill>
+              <a:schemeClr val="tx1"/>
+            </a:solidFill>
+          </a:ln>
+        </p:spPr>
+        <p:style>
+          <a:lnRef idx="2">
+            <a:schemeClr val="accent1">
+              <a:shade val="50000"/>
+            </a:schemeClr>
+          </a:lnRef>
+          <a:fillRef idx="1">
+            <a:schemeClr val="accent1"/>
+          </a:fillRef>
+          <a:effectRef idx="0">
+            <a:schemeClr val="accent1"/>
+          </a:effectRef>
+          <a:fontRef idx="minor">
+            <a:schemeClr val="lt1"/>
+          </a:fontRef>
+        </p:style>
+        <p:txBody>
+          <a:bodyPr rtlCol="0" anchor="ctr"/>
+          <a:lstStyle/>
+          <a:p>
+            <a:pPr algn="ctr"/>
+            <a:endParaRPr lang="en-US"/>
+          </a:p>
+        </p:txBody>
+      </p:sp>
+      <p:sp>
+        <p:nvSpPr>
+          <p:cNvPr id="31" name="Oval 30">
+            <a:extLst>
+              <a:ext uri="{FF2B5EF4-FFF2-40B4-BE49-F238E27FC236}">
+                <a16:creationId xmlns:a16="http://schemas.microsoft.com/office/drawing/2014/main" id="{1C615271-8DDB-6847-A9C6-0B90BD98C860}"/>
+              </a:ext>
+            </a:extLst>
+          </p:cNvPr>
+          <p:cNvSpPr/>
+          <p:nvPr/>
+        </p:nvSpPr>
+        <p:spPr>
+          <a:xfrm>
+            <a:off x="2111473" y="3330732"/>
+            <a:ext cx="250295" cy="209498"/>
+          </a:xfrm>
+          <a:prstGeom prst="ellipse">
+            <a:avLst/>
+          </a:prstGeom>
+          <a:solidFill>
+            <a:schemeClr val="tx1">
+              <a:lumMod val="50000"/>
+              <a:lumOff val="50000"/>
+            </a:schemeClr>
+          </a:solidFill>
+          <a:ln>
+            <a:solidFill>
+              <a:schemeClr val="tx1"/>
+            </a:solidFill>
+          </a:ln>
+        </p:spPr>
+        <p:style>
+          <a:lnRef idx="2">
+            <a:schemeClr val="accent1">
+              <a:shade val="50000"/>
+            </a:schemeClr>
+          </a:lnRef>
+          <a:fillRef idx="1">
+            <a:schemeClr val="accent1"/>
+          </a:fillRef>
+          <a:effectRef idx="0">
+            <a:schemeClr val="accent1"/>
+          </a:effectRef>
+          <a:fontRef idx="minor">
+            <a:schemeClr val="lt1"/>
+          </a:fontRef>
+        </p:style>
+        <p:txBody>
+          <a:bodyPr rtlCol="0" anchor="ctr"/>
+          <a:lstStyle/>
+          <a:p>
+            <a:pPr algn="ctr"/>
+            <a:endParaRPr lang="en-US"/>
+          </a:p>
+        </p:txBody>
+      </p:sp>
+      <p:sp>
+        <p:nvSpPr>
+          <p:cNvPr id="32" name="Oval 31">
+            <a:extLst>
+              <a:ext uri="{FF2B5EF4-FFF2-40B4-BE49-F238E27FC236}">
+                <a16:creationId xmlns:a16="http://schemas.microsoft.com/office/drawing/2014/main" id="{8AEB3812-C19A-0042-A1AB-D76050B71D48}"/>
+              </a:ext>
+            </a:extLst>
+          </p:cNvPr>
+          <p:cNvSpPr/>
+          <p:nvPr/>
+        </p:nvSpPr>
+        <p:spPr>
+          <a:xfrm>
+            <a:off x="2677378" y="2880786"/>
+            <a:ext cx="250295" cy="209498"/>
+          </a:xfrm>
+          <a:prstGeom prst="ellipse">
+            <a:avLst/>
+          </a:prstGeom>
+          <a:solidFill>
+            <a:schemeClr val="tx1">
+              <a:lumMod val="50000"/>
+              <a:lumOff val="50000"/>
+            </a:schemeClr>
+          </a:solidFill>
+          <a:ln>
+            <a:solidFill>
+              <a:schemeClr val="tx1"/>
+            </a:solidFill>
+          </a:ln>
+        </p:spPr>
+        <p:style>
+          <a:lnRef idx="2">
+            <a:schemeClr val="accent1">
+              <a:shade val="50000"/>
+            </a:schemeClr>
+          </a:lnRef>
+          <a:fillRef idx="1">
+            <a:schemeClr val="accent1"/>
+          </a:fillRef>
+          <a:effectRef idx="0">
+            <a:schemeClr val="accent1"/>
+          </a:effectRef>
+          <a:fontRef idx="minor">
+            <a:schemeClr val="lt1"/>
+          </a:fontRef>
+        </p:style>
+        <p:txBody>
+          <a:bodyPr rtlCol="0" anchor="ctr"/>
+          <a:lstStyle/>
+          <a:p>
+            <a:pPr algn="ctr"/>
+            <a:endParaRPr lang="en-US"/>
+          </a:p>
+        </p:txBody>
+      </p:sp>
+      <p:sp>
+        <p:nvSpPr>
+          <p:cNvPr id="33" name="Oval 32">
+            <a:extLst>
+              <a:ext uri="{FF2B5EF4-FFF2-40B4-BE49-F238E27FC236}">
+                <a16:creationId xmlns:a16="http://schemas.microsoft.com/office/drawing/2014/main" id="{59F1DF73-87D1-9241-9ED7-D1E9FC7CB9EF}"/>
+              </a:ext>
+            </a:extLst>
+          </p:cNvPr>
+          <p:cNvSpPr/>
+          <p:nvPr/>
+        </p:nvSpPr>
+        <p:spPr>
+          <a:xfrm>
+            <a:off x="2562418" y="3259982"/>
+            <a:ext cx="250295" cy="209498"/>
+          </a:xfrm>
+          <a:prstGeom prst="ellipse">
+            <a:avLst/>
+          </a:prstGeom>
+          <a:solidFill>
+            <a:schemeClr val="tx1">
+              <a:lumMod val="50000"/>
+              <a:lumOff val="50000"/>
+            </a:schemeClr>
+          </a:solidFill>
+          <a:ln>
+            <a:solidFill>
+              <a:schemeClr val="tx1"/>
+            </a:solidFill>
+          </a:ln>
+        </p:spPr>
+        <p:style>
+          <a:lnRef idx="2">
+            <a:schemeClr val="accent1">
+              <a:shade val="50000"/>
+            </a:schemeClr>
+          </a:lnRef>
+          <a:fillRef idx="1">
+            <a:schemeClr val="accent1"/>
+          </a:fillRef>
+          <a:effectRef idx="0">
+            <a:schemeClr val="accent1"/>
+          </a:effectRef>
+          <a:fontRef idx="minor">
+            <a:schemeClr val="lt1"/>
+          </a:fontRef>
+        </p:style>
+        <p:txBody>
+          <a:bodyPr rtlCol="0" anchor="ctr"/>
+          <a:lstStyle/>
+          <a:p>
+            <a:pPr algn="ctr"/>
+            <a:endParaRPr lang="en-US"/>
+          </a:p>
+        </p:txBody>
+      </p:sp>
+      <p:sp>
+        <p:nvSpPr>
+          <p:cNvPr id="34" name="Oval 33">
+            <a:extLst>
+              <a:ext uri="{FF2B5EF4-FFF2-40B4-BE49-F238E27FC236}">
+                <a16:creationId xmlns:a16="http://schemas.microsoft.com/office/drawing/2014/main" id="{4CF0CED1-609E-B845-97F5-F6C22840C58D}"/>
+              </a:ext>
+            </a:extLst>
+          </p:cNvPr>
+          <p:cNvSpPr/>
+          <p:nvPr/>
+        </p:nvSpPr>
+        <p:spPr>
+          <a:xfrm>
+            <a:off x="3169815" y="3022043"/>
+            <a:ext cx="250295" cy="209498"/>
+          </a:xfrm>
+          <a:prstGeom prst="ellipse">
+            <a:avLst/>
+          </a:prstGeom>
+          <a:solidFill>
+            <a:schemeClr val="tx1">
+              <a:lumMod val="50000"/>
+              <a:lumOff val="50000"/>
+            </a:schemeClr>
+          </a:solidFill>
+          <a:ln>
+            <a:solidFill>
+              <a:schemeClr val="tx1"/>
+            </a:solidFill>
+          </a:ln>
+        </p:spPr>
+        <p:style>
+          <a:lnRef idx="2">
+            <a:schemeClr val="accent1">
+              <a:shade val="50000"/>
+            </a:schemeClr>
+          </a:lnRef>
+          <a:fillRef idx="1">
+            <a:schemeClr val="accent1"/>
+          </a:fillRef>
+          <a:effectRef idx="0">
+            <a:schemeClr val="accent1"/>
+          </a:effectRef>
+          <a:fontRef idx="minor">
+            <a:schemeClr val="lt1"/>
+          </a:fontRef>
+        </p:style>
+        <p:txBody>
+          <a:bodyPr rtlCol="0" anchor="ctr"/>
+          <a:lstStyle/>
+          <a:p>
+            <a:pPr algn="ctr"/>
+            <a:endParaRPr lang="en-US"/>
+          </a:p>
+        </p:txBody>
+      </p:sp>
+      <p:sp>
+        <p:nvSpPr>
+          <p:cNvPr id="35" name="Oval 34">
+            <a:extLst>
+              <a:ext uri="{FF2B5EF4-FFF2-40B4-BE49-F238E27FC236}">
+                <a16:creationId xmlns:a16="http://schemas.microsoft.com/office/drawing/2014/main" id="{38B5E254-BE78-3649-845F-5EF35115FCF9}"/>
+              </a:ext>
+            </a:extLst>
+          </p:cNvPr>
+          <p:cNvSpPr/>
+          <p:nvPr/>
+        </p:nvSpPr>
+        <p:spPr>
+          <a:xfrm>
+            <a:off x="3733177" y="1834104"/>
+            <a:ext cx="250295" cy="209498"/>
+          </a:xfrm>
+          <a:prstGeom prst="ellipse">
+            <a:avLst/>
+          </a:prstGeom>
+          <a:solidFill>
+            <a:schemeClr val="tx1">
+              <a:lumMod val="50000"/>
+              <a:lumOff val="50000"/>
+            </a:schemeClr>
+          </a:solidFill>
+          <a:ln>
+            <a:solidFill>
+              <a:schemeClr val="tx1"/>
+            </a:solidFill>
+          </a:ln>
+        </p:spPr>
+        <p:style>
+          <a:lnRef idx="2">
+            <a:schemeClr val="accent1">
+              <a:shade val="50000"/>
+            </a:schemeClr>
+          </a:lnRef>
+          <a:fillRef idx="1">
+            <a:schemeClr val="accent1"/>
+          </a:fillRef>
+          <a:effectRef idx="0">
+            <a:schemeClr val="accent1"/>
+          </a:effectRef>
+          <a:fontRef idx="minor">
+            <a:schemeClr val="lt1"/>
+          </a:fontRef>
+        </p:style>
+        <p:txBody>
+          <a:bodyPr rtlCol="0" anchor="ctr"/>
+          <a:lstStyle/>
+          <a:p>
+            <a:pPr algn="ctr"/>
+            <a:endParaRPr lang="en-US"/>
+          </a:p>
+        </p:txBody>
+      </p:sp>
+      <p:sp>
+        <p:nvSpPr>
+          <p:cNvPr id="36" name="Oval 35">
+            <a:extLst>
+              <a:ext uri="{FF2B5EF4-FFF2-40B4-BE49-F238E27FC236}">
+                <a16:creationId xmlns:a16="http://schemas.microsoft.com/office/drawing/2014/main" id="{5A65B35D-895E-044D-8B84-303406628503}"/>
+              </a:ext>
+            </a:extLst>
+          </p:cNvPr>
+          <p:cNvSpPr/>
+          <p:nvPr/>
+        </p:nvSpPr>
+        <p:spPr>
+          <a:xfrm>
+            <a:off x="3562361" y="1212809"/>
+            <a:ext cx="250295" cy="209498"/>
+          </a:xfrm>
+          <a:prstGeom prst="ellipse">
+            <a:avLst/>
+          </a:prstGeom>
+          <a:solidFill>
+            <a:schemeClr val="tx1">
+              <a:lumMod val="50000"/>
+              <a:lumOff val="50000"/>
+            </a:schemeClr>
+          </a:solidFill>
+          <a:ln>
+            <a:solidFill>
+              <a:schemeClr val="tx1"/>
+            </a:solidFill>
+          </a:ln>
+        </p:spPr>
+        <p:style>
+          <a:lnRef idx="2">
+            <a:schemeClr val="accent1">
+              <a:shade val="50000"/>
+            </a:schemeClr>
+          </a:lnRef>
+          <a:fillRef idx="1">
+            <a:schemeClr val="accent1"/>
+          </a:fillRef>
+          <a:effectRef idx="0">
+            <a:schemeClr val="accent1"/>
+          </a:effectRef>
+          <a:fontRef idx="minor">
+            <a:schemeClr val="lt1"/>
+          </a:fontRef>
+        </p:style>
+        <p:txBody>
+          <a:bodyPr rtlCol="0" anchor="ctr"/>
+          <a:lstStyle/>
+          <a:p>
+            <a:pPr algn="ctr"/>
+            <a:endParaRPr lang="en-US"/>
+          </a:p>
+        </p:txBody>
+      </p:sp>
+      <p:sp>
+        <p:nvSpPr>
+          <p:cNvPr id="37" name="Oval 36">
+            <a:extLst>
+              <a:ext uri="{FF2B5EF4-FFF2-40B4-BE49-F238E27FC236}">
+                <a16:creationId xmlns:a16="http://schemas.microsoft.com/office/drawing/2014/main" id="{A42179E6-440D-DB44-ACC5-FC4BE9A2ED46}"/>
+              </a:ext>
+            </a:extLst>
+          </p:cNvPr>
+          <p:cNvSpPr/>
+          <p:nvPr/>
+        </p:nvSpPr>
+        <p:spPr>
+          <a:xfrm>
+            <a:off x="849628" y="2260100"/>
+            <a:ext cx="250295" cy="209498"/>
+          </a:xfrm>
+          <a:prstGeom prst="ellipse">
+            <a:avLst/>
+          </a:prstGeom>
+          <a:solidFill>
+            <a:schemeClr val="tx1">
+              <a:lumMod val="50000"/>
+              <a:lumOff val="50000"/>
+            </a:schemeClr>
+          </a:solidFill>
+          <a:ln>
+            <a:solidFill>
+              <a:schemeClr val="tx1"/>
+            </a:solidFill>
+          </a:ln>
+        </p:spPr>
+        <p:style>
+          <a:lnRef idx="2">
+            <a:schemeClr val="accent1">
+              <a:shade val="50000"/>
+            </a:schemeClr>
+          </a:lnRef>
+          <a:fillRef idx="1">
+            <a:schemeClr val="accent1"/>
+          </a:fillRef>
+          <a:effectRef idx="0">
+            <a:schemeClr val="accent1"/>
+          </a:effectRef>
+          <a:fontRef idx="minor">
+            <a:schemeClr val="lt1"/>
+          </a:fontRef>
+        </p:style>
+        <p:txBody>
+          <a:bodyPr rtlCol="0" anchor="ctr"/>
+          <a:lstStyle/>
+          <a:p>
+            <a:pPr algn="ctr"/>
+            <a:endParaRPr lang="en-US"/>
+          </a:p>
+        </p:txBody>
+      </p:sp>
+      <p:sp>
+        <p:nvSpPr>
+          <p:cNvPr id="38" name="Oval 37">
+            <a:extLst>
+              <a:ext uri="{FF2B5EF4-FFF2-40B4-BE49-F238E27FC236}">
+                <a16:creationId xmlns:a16="http://schemas.microsoft.com/office/drawing/2014/main" id="{24E39E0B-7FCB-E44B-A20B-CC277B71213D}"/>
+              </a:ext>
+            </a:extLst>
+          </p:cNvPr>
+          <p:cNvSpPr/>
+          <p:nvPr/>
+        </p:nvSpPr>
+        <p:spPr>
+          <a:xfrm>
+            <a:off x="3990140" y="2318049"/>
+            <a:ext cx="250295" cy="209498"/>
+          </a:xfrm>
+          <a:prstGeom prst="ellipse">
+            <a:avLst/>
+          </a:prstGeom>
+          <a:solidFill>
+            <a:schemeClr val="tx1">
+              <a:lumMod val="50000"/>
+              <a:lumOff val="50000"/>
+            </a:schemeClr>
+          </a:solidFill>
+          <a:ln>
+            <a:solidFill>
+              <a:schemeClr val="tx1"/>
+            </a:solidFill>
+          </a:ln>
+        </p:spPr>
+        <p:style>
+          <a:lnRef idx="2">
+            <a:schemeClr val="accent1">
+              <a:shade val="50000"/>
+            </a:schemeClr>
+          </a:lnRef>
+          <a:fillRef idx="1">
+            <a:schemeClr val="accent1"/>
+          </a:fillRef>
+          <a:effectRef idx="0">
+            <a:schemeClr val="accent1"/>
+          </a:effectRef>
+          <a:fontRef idx="minor">
+            <a:schemeClr val="lt1"/>
+          </a:fontRef>
+        </p:style>
+        <p:txBody>
+          <a:bodyPr rtlCol="0" anchor="ctr"/>
+          <a:lstStyle/>
+          <a:p>
+            <a:pPr algn="ctr"/>
+            <a:endParaRPr lang="en-US"/>
+          </a:p>
+        </p:txBody>
+      </p:sp>
+    </p:spTree>
+    <p:extLst>
+      <p:ext uri="{BB962C8B-B14F-4D97-AF65-F5344CB8AC3E}">
+        <p14:creationId xmlns:p14="http://schemas.microsoft.com/office/powerpoint/2010/main" val="3481008583"/>
+      </p:ext>
+    </p:extLst>
+  </p:cSld>
+  <p:clrMapOvr>
+    <a:masterClrMapping/>
+  </p:clrMapOvr>
+</p:sld>
+</file>
+
 <file path=ppt/theme/theme1.xml><?xml version="1.0" encoding="utf-8"?>
 <a:theme xmlns:a="http://schemas.openxmlformats.org/drawingml/2006/main" name="Office Theme">
   <a:themeElements>

</xml_diff>

<commit_message>
Deployed aaaf9c1 with MkDocs version: 1.1.2
</commit_message>
<xml_diff>
--- a/presentations/ekg-book-figures.pptx
+++ b/presentations/ekg-book-figures.pptx
@@ -8703,9 +8703,7 @@
               </a:avLst>
             </a:prstGeom>
             <a:solidFill>
-              <a:schemeClr val="bg1">
-                <a:lumMod val="75000"/>
-              </a:schemeClr>
+              <a:schemeClr val="accent4"/>
             </a:solidFill>
             <a:ln>
               <a:solidFill>
@@ -9410,13 +9408,13 @@
         </p:nvSpPr>
         <p:spPr>
           <a:xfrm>
-            <a:off x="204154" y="187684"/>
-            <a:ext cx="10515600" cy="703510"/>
+            <a:off x="225175" y="142264"/>
+            <a:ext cx="10515600" cy="559289"/>
           </a:xfrm>
         </p:spPr>
         <p:txBody>
           <a:bodyPr>
-            <a:normAutofit/>
+            <a:normAutofit fontScale="90000"/>
           </a:bodyPr>
           <a:lstStyle/>
           <a:p>
@@ -9482,9 +9480,7 @@
             <a:avLst/>
           </a:prstGeom>
           <a:solidFill>
-            <a:schemeClr val="bg1">
-              <a:lumMod val="85000"/>
-            </a:schemeClr>
+            <a:schemeClr val="accent2"/>
           </a:solidFill>
         </p:spPr>
         <p:style>
@@ -9545,9 +9541,7 @@
             <a:avLst/>
           </a:prstGeom>
           <a:solidFill>
-            <a:schemeClr val="bg1">
-              <a:lumMod val="85000"/>
-            </a:schemeClr>
+            <a:schemeClr val="accent2"/>
           </a:solidFill>
         </p:spPr>
         <p:style>
@@ -9608,9 +9602,7 @@
             <a:avLst/>
           </a:prstGeom>
           <a:solidFill>
-            <a:schemeClr val="bg1">
-              <a:lumMod val="85000"/>
-            </a:schemeClr>
+            <a:schemeClr val="accent2"/>
           </a:solidFill>
         </p:spPr>
         <p:style>
@@ -9671,9 +9663,7 @@
             <a:avLst/>
           </a:prstGeom>
           <a:solidFill>
-            <a:schemeClr val="bg1">
-              <a:lumMod val="85000"/>
-            </a:schemeClr>
+            <a:schemeClr val="accent2"/>
           </a:solidFill>
         </p:spPr>
         <p:style>
@@ -9734,9 +9724,7 @@
             <a:avLst/>
           </a:prstGeom>
           <a:solidFill>
-            <a:schemeClr val="bg1">
-              <a:lumMod val="85000"/>
-            </a:schemeClr>
+            <a:schemeClr val="accent2"/>
           </a:solidFill>
         </p:spPr>
         <p:style>

</xml_diff>